<commit_message>
Unit test to show that we support pptx, pptm, ppsx and ppsm (TIKA-418) .thmx will need a POI upgrade, but the file format lacks any text! .xps is still unsupported by POI
git-svn-id: https://svn.apache.org/repos/asf/tika/trunk@958924 13f79535-47bb-0310-9956-ffa450edef68
</commit_message>
<xml_diff>
--- a/tika-parsers/src/test/resources/test-documents/testPPT.pptx
+++ b/tika-parsers/src/test/resources/test-documents/testPPT.pptx
@@ -1,11 +1,13 @@
 
 <file path=ppt/presentation.xml><?xml version="1.0" encoding="utf-8"?>
-<p:presentation xmlns:a="http://schemas.openxmlformats.org/drawingml/2006/main" xmlns:r="http://schemas.openxmlformats.org/officeDocument/2006/relationships" xmlns:p="http://schemas.openxmlformats.org/presentationml/2006/main" strictFirstAndLastChars="0" saveSubsetFonts="1">
+<p:presentation xmlns:a="http://schemas.openxmlformats.org/drawingml/2006/main" xmlns:r="http://schemas.openxmlformats.org/officeDocument/2006/relationships" xmlns:p="http://schemas.openxmlformats.org/presentationml/2006/main" saveSubsetFonts="1">
   <p:sldMasterIdLst>
     <p:sldMasterId id="2147483648" r:id="rId1"/>
   </p:sldMasterIdLst>
   <p:sldIdLst>
     <p:sldId id="256" r:id="rId2"/>
+    <p:sldId id="257" r:id="rId3"/>
+    <p:sldId id="258" r:id="rId4"/>
   </p:sldIdLst>
   <p:sldSz cx="9144000" cy="6858000" type="screen4x3"/>
   <p:notesSz cx="6858000" cy="9144000"/>
@@ -13,122 +15,92 @@
     <a:defPPr>
       <a:defRPr lang="en-US"/>
     </a:defPPr>
-    <a:lvl1pPr algn="l" rtl="0" eaLnBrk="0" fontAlgn="base" hangingPunct="0">
-      <a:spcBef>
-        <a:spcPct val="0"/>
-      </a:spcBef>
-      <a:spcAft>
-        <a:spcPct val="0"/>
-      </a:spcAft>
-      <a:defRPr sz="2400" kern="1200">
+    <a:lvl1pPr marL="0" algn="l" defTabSz="914400" rtl="0" eaLnBrk="1" latinLnBrk="0" hangingPunct="1">
+      <a:defRPr sz="1800" kern="1200">
         <a:solidFill>
           <a:schemeClr val="tx1"/>
         </a:solidFill>
-        <a:latin typeface="Times"/>
+        <a:latin typeface="+mn-lt"/>
         <a:ea typeface="+mn-ea"/>
         <a:cs typeface="+mn-cs"/>
       </a:defRPr>
     </a:lvl1pPr>
-    <a:lvl2pPr marL="457200" algn="l" rtl="0" eaLnBrk="0" fontAlgn="base" hangingPunct="0">
-      <a:spcBef>
-        <a:spcPct val="0"/>
-      </a:spcBef>
-      <a:spcAft>
-        <a:spcPct val="0"/>
-      </a:spcAft>
-      <a:defRPr sz="2400" kern="1200">
+    <a:lvl2pPr marL="457200" algn="l" defTabSz="914400" rtl="0" eaLnBrk="1" latinLnBrk="0" hangingPunct="1">
+      <a:defRPr sz="1800" kern="1200">
         <a:solidFill>
           <a:schemeClr val="tx1"/>
         </a:solidFill>
-        <a:latin typeface="Times"/>
+        <a:latin typeface="+mn-lt"/>
         <a:ea typeface="+mn-ea"/>
         <a:cs typeface="+mn-cs"/>
       </a:defRPr>
     </a:lvl2pPr>
-    <a:lvl3pPr marL="914400" algn="l" rtl="0" eaLnBrk="0" fontAlgn="base" hangingPunct="0">
-      <a:spcBef>
-        <a:spcPct val="0"/>
-      </a:spcBef>
-      <a:spcAft>
-        <a:spcPct val="0"/>
-      </a:spcAft>
-      <a:defRPr sz="2400" kern="1200">
+    <a:lvl3pPr marL="914400" algn="l" defTabSz="914400" rtl="0" eaLnBrk="1" latinLnBrk="0" hangingPunct="1">
+      <a:defRPr sz="1800" kern="1200">
         <a:solidFill>
           <a:schemeClr val="tx1"/>
         </a:solidFill>
-        <a:latin typeface="Times"/>
+        <a:latin typeface="+mn-lt"/>
         <a:ea typeface="+mn-ea"/>
         <a:cs typeface="+mn-cs"/>
       </a:defRPr>
     </a:lvl3pPr>
-    <a:lvl4pPr marL="1371600" algn="l" rtl="0" eaLnBrk="0" fontAlgn="base" hangingPunct="0">
-      <a:spcBef>
-        <a:spcPct val="0"/>
-      </a:spcBef>
-      <a:spcAft>
-        <a:spcPct val="0"/>
-      </a:spcAft>
-      <a:defRPr sz="2400" kern="1200">
+    <a:lvl4pPr marL="1371600" algn="l" defTabSz="914400" rtl="0" eaLnBrk="1" latinLnBrk="0" hangingPunct="1">
+      <a:defRPr sz="1800" kern="1200">
         <a:solidFill>
           <a:schemeClr val="tx1"/>
         </a:solidFill>
-        <a:latin typeface="Times"/>
+        <a:latin typeface="+mn-lt"/>
         <a:ea typeface="+mn-ea"/>
         <a:cs typeface="+mn-cs"/>
       </a:defRPr>
     </a:lvl4pPr>
-    <a:lvl5pPr marL="1828800" algn="l" rtl="0" eaLnBrk="0" fontAlgn="base" hangingPunct="0">
-      <a:spcBef>
-        <a:spcPct val="0"/>
-      </a:spcBef>
-      <a:spcAft>
-        <a:spcPct val="0"/>
-      </a:spcAft>
-      <a:defRPr sz="2400" kern="1200">
+    <a:lvl5pPr marL="1828800" algn="l" defTabSz="914400" rtl="0" eaLnBrk="1" latinLnBrk="0" hangingPunct="1">
+      <a:defRPr sz="1800" kern="1200">
         <a:solidFill>
           <a:schemeClr val="tx1"/>
         </a:solidFill>
-        <a:latin typeface="Times"/>
+        <a:latin typeface="+mn-lt"/>
         <a:ea typeface="+mn-ea"/>
         <a:cs typeface="+mn-cs"/>
       </a:defRPr>
     </a:lvl5pPr>
     <a:lvl6pPr marL="2286000" algn="l" defTabSz="914400" rtl="0" eaLnBrk="1" latinLnBrk="0" hangingPunct="1">
-      <a:defRPr sz="2400" kern="1200">
+      <a:defRPr sz="1800" kern="1200">
         <a:solidFill>
           <a:schemeClr val="tx1"/>
         </a:solidFill>
-        <a:latin typeface="Times"/>
+        <a:latin typeface="+mn-lt"/>
         <a:ea typeface="+mn-ea"/>
         <a:cs typeface="+mn-cs"/>
       </a:defRPr>
     </a:lvl6pPr>
     <a:lvl7pPr marL="2743200" algn="l" defTabSz="914400" rtl="0" eaLnBrk="1" latinLnBrk="0" hangingPunct="1">
-      <a:defRPr sz="2400" kern="1200">
+      <a:defRPr sz="1800" kern="1200">
         <a:solidFill>
           <a:schemeClr val="tx1"/>
         </a:solidFill>
-        <a:latin typeface="Times"/>
+        <a:latin typeface="+mn-lt"/>
         <a:ea typeface="+mn-ea"/>
         <a:cs typeface="+mn-cs"/>
       </a:defRPr>
     </a:lvl7pPr>
     <a:lvl8pPr marL="3200400" algn="l" defTabSz="914400" rtl="0" eaLnBrk="1" latinLnBrk="0" hangingPunct="1">
-      <a:defRPr sz="2400" kern="1200">
+      <a:defRPr sz="1800" kern="1200">
         <a:solidFill>
           <a:schemeClr val="tx1"/>
         </a:solidFill>
-        <a:latin typeface="Times"/>
+        <a:latin typeface="+mn-lt"/>
         <a:ea typeface="+mn-ea"/>
         <a:cs typeface="+mn-cs"/>
       </a:defRPr>
     </a:lvl8pPr>
     <a:lvl9pPr marL="3657600" algn="l" defTabSz="914400" rtl="0" eaLnBrk="1" latinLnBrk="0" hangingPunct="1">
-      <a:defRPr sz="2400" kern="1200">
+      <a:defRPr sz="1800" kern="1200">
         <a:solidFill>
           <a:schemeClr val="tx1"/>
         </a:solidFill>
-        <a:latin typeface="Times"/>
+        <a:latin typeface="+mn-lt"/>
         <a:ea typeface="+mn-ea"/>
         <a:cs typeface="+mn-cs"/>
       </a:defRPr>
@@ -203,39 +175,93 @@
           <a:lstStyle>
             <a:lvl1pPr marL="0" indent="0" algn="ctr">
               <a:buNone/>
-              <a:defRPr/>
+              <a:defRPr>
+                <a:solidFill>
+                  <a:schemeClr val="tx1">
+                    <a:tint val="75000"/>
+                  </a:schemeClr>
+                </a:solidFill>
+              </a:defRPr>
             </a:lvl1pPr>
             <a:lvl2pPr marL="457200" indent="0" algn="ctr">
               <a:buNone/>
-              <a:defRPr/>
+              <a:defRPr>
+                <a:solidFill>
+                  <a:schemeClr val="tx1">
+                    <a:tint val="75000"/>
+                  </a:schemeClr>
+                </a:solidFill>
+              </a:defRPr>
             </a:lvl2pPr>
             <a:lvl3pPr marL="914400" indent="0" algn="ctr">
               <a:buNone/>
-              <a:defRPr/>
+              <a:defRPr>
+                <a:solidFill>
+                  <a:schemeClr val="tx1">
+                    <a:tint val="75000"/>
+                  </a:schemeClr>
+                </a:solidFill>
+              </a:defRPr>
             </a:lvl3pPr>
             <a:lvl4pPr marL="1371600" indent="0" algn="ctr">
               <a:buNone/>
-              <a:defRPr/>
+              <a:defRPr>
+                <a:solidFill>
+                  <a:schemeClr val="tx1">
+                    <a:tint val="75000"/>
+                  </a:schemeClr>
+                </a:solidFill>
+              </a:defRPr>
             </a:lvl4pPr>
             <a:lvl5pPr marL="1828800" indent="0" algn="ctr">
               <a:buNone/>
-              <a:defRPr/>
+              <a:defRPr>
+                <a:solidFill>
+                  <a:schemeClr val="tx1">
+                    <a:tint val="75000"/>
+                  </a:schemeClr>
+                </a:solidFill>
+              </a:defRPr>
             </a:lvl5pPr>
             <a:lvl6pPr marL="2286000" indent="0" algn="ctr">
               <a:buNone/>
-              <a:defRPr/>
+              <a:defRPr>
+                <a:solidFill>
+                  <a:schemeClr val="tx1">
+                    <a:tint val="75000"/>
+                  </a:schemeClr>
+                </a:solidFill>
+              </a:defRPr>
             </a:lvl6pPr>
             <a:lvl7pPr marL="2743200" indent="0" algn="ctr">
               <a:buNone/>
-              <a:defRPr/>
+              <a:defRPr>
+                <a:solidFill>
+                  <a:schemeClr val="tx1">
+                    <a:tint val="75000"/>
+                  </a:schemeClr>
+                </a:solidFill>
+              </a:defRPr>
             </a:lvl7pPr>
             <a:lvl8pPr marL="3200400" indent="0" algn="ctr">
               <a:buNone/>
-              <a:defRPr/>
+              <a:defRPr>
+                <a:solidFill>
+                  <a:schemeClr val="tx1">
+                    <a:tint val="75000"/>
+                  </a:schemeClr>
+                </a:solidFill>
+              </a:defRPr>
             </a:lvl8pPr>
             <a:lvl9pPr marL="3657600" indent="0" algn="ctr">
               <a:buNone/>
-              <a:defRPr/>
+              <a:defRPr>
+                <a:solidFill>
+                  <a:schemeClr val="tx1">
+                    <a:tint val="75000"/>
+                  </a:schemeClr>
+                </a:solidFill>
+              </a:defRPr>
             </a:lvl9pPr>
           </a:lstStyle>
           <a:p>
@@ -260,12 +286,13 @@
         <p:spPr/>
         <p:txBody>
           <a:bodyPr/>
-          <a:lstStyle>
-            <a:lvl1pPr>
-              <a:defRPr/>
-            </a:lvl1pPr>
-          </a:lstStyle>
-          <a:p>
+          <a:lstStyle/>
+          <a:p>
+            <a:fld id="{4292FB91-9E56-41B8-B092-BF0841198C0C}" type="datetimeFigureOut">
+              <a:rPr lang="en-US" smtClean="0"/>
+              <a:pPr/>
+              <a:t>6/29/2010</a:t>
+            </a:fld>
             <a:endParaRPr lang="en-US"/>
           </a:p>
         </p:txBody>
@@ -283,11 +310,7 @@
         <p:spPr/>
         <p:txBody>
           <a:bodyPr/>
-          <a:lstStyle>
-            <a:lvl1pPr>
-              <a:defRPr/>
-            </a:lvl1pPr>
-          </a:lstStyle>
+          <a:lstStyle/>
           <a:p>
             <a:endParaRPr lang="en-US"/>
           </a:p>
@@ -306,14 +329,10 @@
         <p:spPr/>
         <p:txBody>
           <a:bodyPr/>
-          <a:lstStyle>
-            <a:lvl1pPr>
-              <a:defRPr/>
-            </a:lvl1pPr>
-          </a:lstStyle>
-          <a:p>
-            <a:fld id="{ABE59D8D-261C-4BD3-BF3C-A74FF445B9F8}" type="slidenum">
-              <a:rPr lang="en-US"/>
+          <a:lstStyle/>
+          <a:p>
+            <a:fld id="{704237C1-FA28-4D2E-A64B-6359CE50665C}" type="slidenum">
+              <a:rPr lang="en-US" smtClean="0"/>
               <a:pPr/>
               <a:t>‹#›</a:t>
             </a:fld>
@@ -434,12 +453,13 @@
         <p:spPr/>
         <p:txBody>
           <a:bodyPr/>
-          <a:lstStyle>
-            <a:lvl1pPr>
-              <a:defRPr/>
-            </a:lvl1pPr>
-          </a:lstStyle>
-          <a:p>
+          <a:lstStyle/>
+          <a:p>
+            <a:fld id="{4292FB91-9E56-41B8-B092-BF0841198C0C}" type="datetimeFigureOut">
+              <a:rPr lang="en-US" smtClean="0"/>
+              <a:pPr/>
+              <a:t>6/29/2010</a:t>
+            </a:fld>
             <a:endParaRPr lang="en-US"/>
           </a:p>
         </p:txBody>
@@ -457,11 +477,7 @@
         <p:spPr/>
         <p:txBody>
           <a:bodyPr/>
-          <a:lstStyle>
-            <a:lvl1pPr>
-              <a:defRPr/>
-            </a:lvl1pPr>
-          </a:lstStyle>
+          <a:lstStyle/>
           <a:p>
             <a:endParaRPr lang="en-US"/>
           </a:p>
@@ -480,14 +496,10 @@
         <p:spPr/>
         <p:txBody>
           <a:bodyPr/>
-          <a:lstStyle>
-            <a:lvl1pPr>
-              <a:defRPr/>
-            </a:lvl1pPr>
-          </a:lstStyle>
-          <a:p>
-            <a:fld id="{B83C0F93-87AC-4BEA-8AA7-A7CA04599A7A}" type="slidenum">
-              <a:rPr lang="en-US"/>
+          <a:lstStyle/>
+          <a:p>
+            <a:fld id="{704237C1-FA28-4D2E-A64B-6359CE50665C}" type="slidenum">
+              <a:rPr lang="en-US" smtClean="0"/>
               <a:pPr/>
               <a:t>‹#›</a:t>
             </a:fld>
@@ -532,8 +544,8 @@
         </p:nvSpPr>
         <p:spPr>
           <a:xfrm>
-            <a:off x="6515100" y="609600"/>
-            <a:ext cx="1943100" cy="5486400"/>
+            <a:off x="6629400" y="274638"/>
+            <a:ext cx="2057400" cy="5851525"/>
           </a:xfrm>
         </p:spPr>
         <p:txBody>
@@ -560,8 +572,8 @@
         </p:nvSpPr>
         <p:spPr>
           <a:xfrm>
-            <a:off x="685800" y="609600"/>
-            <a:ext cx="5676900" cy="5486400"/>
+            <a:off x="457200" y="274638"/>
+            <a:ext cx="6019800" cy="5851525"/>
           </a:xfrm>
         </p:spPr>
         <p:txBody>
@@ -618,12 +630,13 @@
         <p:spPr/>
         <p:txBody>
           <a:bodyPr/>
-          <a:lstStyle>
-            <a:lvl1pPr>
-              <a:defRPr/>
-            </a:lvl1pPr>
-          </a:lstStyle>
-          <a:p>
+          <a:lstStyle/>
+          <a:p>
+            <a:fld id="{4292FB91-9E56-41B8-B092-BF0841198C0C}" type="datetimeFigureOut">
+              <a:rPr lang="en-US" smtClean="0"/>
+              <a:pPr/>
+              <a:t>6/29/2010</a:t>
+            </a:fld>
             <a:endParaRPr lang="en-US"/>
           </a:p>
         </p:txBody>
@@ -641,11 +654,7 @@
         <p:spPr/>
         <p:txBody>
           <a:bodyPr/>
-          <a:lstStyle>
-            <a:lvl1pPr>
-              <a:defRPr/>
-            </a:lvl1pPr>
-          </a:lstStyle>
+          <a:lstStyle/>
           <a:p>
             <a:endParaRPr lang="en-US"/>
           </a:p>
@@ -664,14 +673,10 @@
         <p:spPr/>
         <p:txBody>
           <a:bodyPr/>
-          <a:lstStyle>
-            <a:lvl1pPr>
-              <a:defRPr/>
-            </a:lvl1pPr>
-          </a:lstStyle>
-          <a:p>
-            <a:fld id="{7D2F41C1-6085-4B39-B281-7C84DE6666E1}" type="slidenum">
-              <a:rPr lang="en-US"/>
+          <a:lstStyle/>
+          <a:p>
+            <a:fld id="{704237C1-FA28-4D2E-A64B-6359CE50665C}" type="slidenum">
+              <a:rPr lang="en-US" smtClean="0"/>
               <a:pPr/>
               <a:t>‹#›</a:t>
             </a:fld>
@@ -792,12 +797,13 @@
         <p:spPr/>
         <p:txBody>
           <a:bodyPr/>
-          <a:lstStyle>
-            <a:lvl1pPr>
-              <a:defRPr/>
-            </a:lvl1pPr>
-          </a:lstStyle>
-          <a:p>
+          <a:lstStyle/>
+          <a:p>
+            <a:fld id="{4292FB91-9E56-41B8-B092-BF0841198C0C}" type="datetimeFigureOut">
+              <a:rPr lang="en-US" smtClean="0"/>
+              <a:pPr/>
+              <a:t>6/29/2010</a:t>
+            </a:fld>
             <a:endParaRPr lang="en-US"/>
           </a:p>
         </p:txBody>
@@ -815,11 +821,7 @@
         <p:spPr/>
         <p:txBody>
           <a:bodyPr/>
-          <a:lstStyle>
-            <a:lvl1pPr>
-              <a:defRPr/>
-            </a:lvl1pPr>
-          </a:lstStyle>
+          <a:lstStyle/>
           <a:p>
             <a:endParaRPr lang="en-US"/>
           </a:p>
@@ -838,14 +840,10 @@
         <p:spPr/>
         <p:txBody>
           <a:bodyPr/>
-          <a:lstStyle>
-            <a:lvl1pPr>
-              <a:defRPr/>
-            </a:lvl1pPr>
-          </a:lstStyle>
-          <a:p>
-            <a:fld id="{A78373EE-C751-4902-86A1-3918C6618F3A}" type="slidenum">
-              <a:rPr lang="en-US"/>
+          <a:lstStyle/>
+          <a:p>
+            <a:fld id="{704237C1-FA28-4D2E-A64B-6359CE50665C}" type="slidenum">
+              <a:rPr lang="en-US" smtClean="0"/>
               <a:pPr/>
               <a:t>‹#›</a:t>
             </a:fld>
@@ -931,39 +929,93 @@
           <a:lstStyle>
             <a:lvl1pPr marL="0" indent="0">
               <a:buNone/>
-              <a:defRPr sz="2000"/>
+              <a:defRPr sz="2000">
+                <a:solidFill>
+                  <a:schemeClr val="tx1">
+                    <a:tint val="75000"/>
+                  </a:schemeClr>
+                </a:solidFill>
+              </a:defRPr>
             </a:lvl1pPr>
             <a:lvl2pPr marL="457200" indent="0">
               <a:buNone/>
-              <a:defRPr sz="1800"/>
+              <a:defRPr sz="1800">
+                <a:solidFill>
+                  <a:schemeClr val="tx1">
+                    <a:tint val="75000"/>
+                  </a:schemeClr>
+                </a:solidFill>
+              </a:defRPr>
             </a:lvl2pPr>
             <a:lvl3pPr marL="914400" indent="0">
               <a:buNone/>
-              <a:defRPr sz="1600"/>
+              <a:defRPr sz="1600">
+                <a:solidFill>
+                  <a:schemeClr val="tx1">
+                    <a:tint val="75000"/>
+                  </a:schemeClr>
+                </a:solidFill>
+              </a:defRPr>
             </a:lvl3pPr>
             <a:lvl4pPr marL="1371600" indent="0">
               <a:buNone/>
-              <a:defRPr sz="1400"/>
+              <a:defRPr sz="1400">
+                <a:solidFill>
+                  <a:schemeClr val="tx1">
+                    <a:tint val="75000"/>
+                  </a:schemeClr>
+                </a:solidFill>
+              </a:defRPr>
             </a:lvl4pPr>
             <a:lvl5pPr marL="1828800" indent="0">
               <a:buNone/>
-              <a:defRPr sz="1400"/>
+              <a:defRPr sz="1400">
+                <a:solidFill>
+                  <a:schemeClr val="tx1">
+                    <a:tint val="75000"/>
+                  </a:schemeClr>
+                </a:solidFill>
+              </a:defRPr>
             </a:lvl5pPr>
             <a:lvl6pPr marL="2286000" indent="0">
               <a:buNone/>
-              <a:defRPr sz="1400"/>
+              <a:defRPr sz="1400">
+                <a:solidFill>
+                  <a:schemeClr val="tx1">
+                    <a:tint val="75000"/>
+                  </a:schemeClr>
+                </a:solidFill>
+              </a:defRPr>
             </a:lvl6pPr>
             <a:lvl7pPr marL="2743200" indent="0">
               <a:buNone/>
-              <a:defRPr sz="1400"/>
+              <a:defRPr sz="1400">
+                <a:solidFill>
+                  <a:schemeClr val="tx1">
+                    <a:tint val="75000"/>
+                  </a:schemeClr>
+                </a:solidFill>
+              </a:defRPr>
             </a:lvl7pPr>
             <a:lvl8pPr marL="3200400" indent="0">
               <a:buNone/>
-              <a:defRPr sz="1400"/>
+              <a:defRPr sz="1400">
+                <a:solidFill>
+                  <a:schemeClr val="tx1">
+                    <a:tint val="75000"/>
+                  </a:schemeClr>
+                </a:solidFill>
+              </a:defRPr>
             </a:lvl8pPr>
             <a:lvl9pPr marL="3657600" indent="0">
               <a:buNone/>
-              <a:defRPr sz="1400"/>
+              <a:defRPr sz="1400">
+                <a:solidFill>
+                  <a:schemeClr val="tx1">
+                    <a:tint val="75000"/>
+                  </a:schemeClr>
+                </a:solidFill>
+              </a:defRPr>
             </a:lvl9pPr>
           </a:lstStyle>
           <a:p>
@@ -988,12 +1040,13 @@
         <p:spPr/>
         <p:txBody>
           <a:bodyPr/>
-          <a:lstStyle>
-            <a:lvl1pPr>
-              <a:defRPr/>
-            </a:lvl1pPr>
-          </a:lstStyle>
-          <a:p>
+          <a:lstStyle/>
+          <a:p>
+            <a:fld id="{4292FB91-9E56-41B8-B092-BF0841198C0C}" type="datetimeFigureOut">
+              <a:rPr lang="en-US" smtClean="0"/>
+              <a:pPr/>
+              <a:t>6/29/2010</a:t>
+            </a:fld>
             <a:endParaRPr lang="en-US"/>
           </a:p>
         </p:txBody>
@@ -1011,11 +1064,7 @@
         <p:spPr/>
         <p:txBody>
           <a:bodyPr/>
-          <a:lstStyle>
-            <a:lvl1pPr>
-              <a:defRPr/>
-            </a:lvl1pPr>
-          </a:lstStyle>
+          <a:lstStyle/>
           <a:p>
             <a:endParaRPr lang="en-US"/>
           </a:p>
@@ -1034,14 +1083,10 @@
         <p:spPr/>
         <p:txBody>
           <a:bodyPr/>
-          <a:lstStyle>
-            <a:lvl1pPr>
-              <a:defRPr/>
-            </a:lvl1pPr>
-          </a:lstStyle>
-          <a:p>
-            <a:fld id="{AD39FBDE-BEF1-49E6-A2E6-B4516A4924D6}" type="slidenum">
-              <a:rPr lang="en-US"/>
+          <a:lstStyle/>
+          <a:p>
+            <a:fld id="{704237C1-FA28-4D2E-A64B-6359CE50665C}" type="slidenum">
+              <a:rPr lang="en-US" smtClean="0"/>
               <a:pPr/>
               <a:t>‹#›</a:t>
             </a:fld>
@@ -1109,8 +1154,8 @@
         </p:nvSpPr>
         <p:spPr>
           <a:xfrm>
-            <a:off x="685800" y="1981200"/>
-            <a:ext cx="3810000" cy="4114800"/>
+            <a:off x="457200" y="1600200"/>
+            <a:ext cx="4038600" cy="4525963"/>
           </a:xfrm>
         </p:spPr>
         <p:txBody>
@@ -1194,8 +1239,8 @@
         </p:nvSpPr>
         <p:spPr>
           <a:xfrm>
-            <a:off x="4648200" y="1981200"/>
-            <a:ext cx="3810000" cy="4114800"/>
+            <a:off x="4648200" y="1600200"/>
+            <a:ext cx="4038600" cy="4525963"/>
           </a:xfrm>
         </p:spPr>
         <p:txBody>
@@ -1280,12 +1325,13 @@
         <p:spPr/>
         <p:txBody>
           <a:bodyPr/>
-          <a:lstStyle>
-            <a:lvl1pPr>
-              <a:defRPr/>
-            </a:lvl1pPr>
-          </a:lstStyle>
-          <a:p>
+          <a:lstStyle/>
+          <a:p>
+            <a:fld id="{4292FB91-9E56-41B8-B092-BF0841198C0C}" type="datetimeFigureOut">
+              <a:rPr lang="en-US" smtClean="0"/>
+              <a:pPr/>
+              <a:t>6/29/2010</a:t>
+            </a:fld>
             <a:endParaRPr lang="en-US"/>
           </a:p>
         </p:txBody>
@@ -1303,11 +1349,7 @@
         <p:spPr/>
         <p:txBody>
           <a:bodyPr/>
-          <a:lstStyle>
-            <a:lvl1pPr>
-              <a:defRPr/>
-            </a:lvl1pPr>
-          </a:lstStyle>
+          <a:lstStyle/>
           <a:p>
             <a:endParaRPr lang="en-US"/>
           </a:p>
@@ -1326,14 +1368,10 @@
         <p:spPr/>
         <p:txBody>
           <a:bodyPr/>
-          <a:lstStyle>
-            <a:lvl1pPr>
-              <a:defRPr/>
-            </a:lvl1pPr>
-          </a:lstStyle>
-          <a:p>
-            <a:fld id="{5C48B118-E10E-4715-9B05-2207C78589B1}" type="slidenum">
-              <a:rPr lang="en-US"/>
+          <a:lstStyle/>
+          <a:p>
+            <a:fld id="{704237C1-FA28-4D2E-A64B-6359CE50665C}" type="slidenum">
+              <a:rPr lang="en-US" smtClean="0"/>
               <a:pPr/>
               <a:t>‹#›</a:t>
             </a:fld>
@@ -1376,12 +1414,7 @@
             <p:ph type="title"/>
           </p:nvPr>
         </p:nvSpPr>
-        <p:spPr>
-          <a:xfrm>
-            <a:off x="457200" y="274638"/>
-            <a:ext cx="8229600" cy="1143000"/>
-          </a:xfrm>
-        </p:spPr>
+        <p:spPr/>
         <p:txBody>
           <a:bodyPr/>
           <a:lstStyle>
@@ -1711,12 +1744,13 @@
         <p:spPr/>
         <p:txBody>
           <a:bodyPr/>
-          <a:lstStyle>
-            <a:lvl1pPr>
-              <a:defRPr/>
-            </a:lvl1pPr>
-          </a:lstStyle>
-          <a:p>
+          <a:lstStyle/>
+          <a:p>
+            <a:fld id="{4292FB91-9E56-41B8-B092-BF0841198C0C}" type="datetimeFigureOut">
+              <a:rPr lang="en-US" smtClean="0"/>
+              <a:pPr/>
+              <a:t>6/29/2010</a:t>
+            </a:fld>
             <a:endParaRPr lang="en-US"/>
           </a:p>
         </p:txBody>
@@ -1734,11 +1768,7 @@
         <p:spPr/>
         <p:txBody>
           <a:bodyPr/>
-          <a:lstStyle>
-            <a:lvl1pPr>
-              <a:defRPr/>
-            </a:lvl1pPr>
-          </a:lstStyle>
+          <a:lstStyle/>
           <a:p>
             <a:endParaRPr lang="en-US"/>
           </a:p>
@@ -1757,14 +1787,10 @@
         <p:spPr/>
         <p:txBody>
           <a:bodyPr/>
-          <a:lstStyle>
-            <a:lvl1pPr>
-              <a:defRPr/>
-            </a:lvl1pPr>
-          </a:lstStyle>
-          <a:p>
-            <a:fld id="{A68DB8C5-85DE-4DEC-9D33-21869BDA21E3}" type="slidenum">
-              <a:rPr lang="en-US"/>
+          <a:lstStyle/>
+          <a:p>
+            <a:fld id="{704237C1-FA28-4D2E-A64B-6359CE50665C}" type="slidenum">
+              <a:rPr lang="en-US" smtClean="0"/>
               <a:pPr/>
               <a:t>‹#›</a:t>
             </a:fld>
@@ -1833,12 +1859,13 @@
         <p:spPr/>
         <p:txBody>
           <a:bodyPr/>
-          <a:lstStyle>
-            <a:lvl1pPr>
-              <a:defRPr/>
-            </a:lvl1pPr>
-          </a:lstStyle>
-          <a:p>
+          <a:lstStyle/>
+          <a:p>
+            <a:fld id="{4292FB91-9E56-41B8-B092-BF0841198C0C}" type="datetimeFigureOut">
+              <a:rPr lang="en-US" smtClean="0"/>
+              <a:pPr/>
+              <a:t>6/29/2010</a:t>
+            </a:fld>
             <a:endParaRPr lang="en-US"/>
           </a:p>
         </p:txBody>
@@ -1856,11 +1883,7 @@
         <p:spPr/>
         <p:txBody>
           <a:bodyPr/>
-          <a:lstStyle>
-            <a:lvl1pPr>
-              <a:defRPr/>
-            </a:lvl1pPr>
-          </a:lstStyle>
+          <a:lstStyle/>
           <a:p>
             <a:endParaRPr lang="en-US"/>
           </a:p>
@@ -1879,14 +1902,10 @@
         <p:spPr/>
         <p:txBody>
           <a:bodyPr/>
-          <a:lstStyle>
-            <a:lvl1pPr>
-              <a:defRPr/>
-            </a:lvl1pPr>
-          </a:lstStyle>
-          <a:p>
-            <a:fld id="{D47DBFAA-ADE5-4CAE-A855-A944C142F36F}" type="slidenum">
-              <a:rPr lang="en-US"/>
+          <a:lstStyle/>
+          <a:p>
+            <a:fld id="{704237C1-FA28-4D2E-A64B-6359CE50665C}" type="slidenum">
+              <a:rPr lang="en-US" smtClean="0"/>
               <a:pPr/>
               <a:t>‹#›</a:t>
             </a:fld>
@@ -1932,12 +1951,13 @@
         <p:spPr/>
         <p:txBody>
           <a:bodyPr/>
-          <a:lstStyle>
-            <a:lvl1pPr>
-              <a:defRPr/>
-            </a:lvl1pPr>
-          </a:lstStyle>
-          <a:p>
+          <a:lstStyle/>
+          <a:p>
+            <a:fld id="{4292FB91-9E56-41B8-B092-BF0841198C0C}" type="datetimeFigureOut">
+              <a:rPr lang="en-US" smtClean="0"/>
+              <a:pPr/>
+              <a:t>6/29/2010</a:t>
+            </a:fld>
             <a:endParaRPr lang="en-US"/>
           </a:p>
         </p:txBody>
@@ -1955,11 +1975,7 @@
         <p:spPr/>
         <p:txBody>
           <a:bodyPr/>
-          <a:lstStyle>
-            <a:lvl1pPr>
-              <a:defRPr/>
-            </a:lvl1pPr>
-          </a:lstStyle>
+          <a:lstStyle/>
           <a:p>
             <a:endParaRPr lang="en-US"/>
           </a:p>
@@ -1978,14 +1994,10 @@
         <p:spPr/>
         <p:txBody>
           <a:bodyPr/>
-          <a:lstStyle>
-            <a:lvl1pPr>
-              <a:defRPr/>
-            </a:lvl1pPr>
-          </a:lstStyle>
-          <a:p>
-            <a:fld id="{89674EF0-217F-4EC5-B06C-9CD98D1486C1}" type="slidenum">
-              <a:rPr lang="en-US"/>
+          <a:lstStyle/>
+          <a:p>
+            <a:fld id="{704237C1-FA28-4D2E-A64B-6359CE50665C}" type="slidenum">
+              <a:rPr lang="en-US" smtClean="0"/>
               <a:pPr/>
               <a:t>‹#›</a:t>
             </a:fld>
@@ -2213,12 +2225,13 @@
         <p:spPr/>
         <p:txBody>
           <a:bodyPr/>
-          <a:lstStyle>
-            <a:lvl1pPr>
-              <a:defRPr/>
-            </a:lvl1pPr>
-          </a:lstStyle>
-          <a:p>
+          <a:lstStyle/>
+          <a:p>
+            <a:fld id="{4292FB91-9E56-41B8-B092-BF0841198C0C}" type="datetimeFigureOut">
+              <a:rPr lang="en-US" smtClean="0"/>
+              <a:pPr/>
+              <a:t>6/29/2010</a:t>
+            </a:fld>
             <a:endParaRPr lang="en-US"/>
           </a:p>
         </p:txBody>
@@ -2236,11 +2249,7 @@
         <p:spPr/>
         <p:txBody>
           <a:bodyPr/>
-          <a:lstStyle>
-            <a:lvl1pPr>
-              <a:defRPr/>
-            </a:lvl1pPr>
-          </a:lstStyle>
+          <a:lstStyle/>
           <a:p>
             <a:endParaRPr lang="en-US"/>
           </a:p>
@@ -2259,14 +2268,10 @@
         <p:spPr/>
         <p:txBody>
           <a:bodyPr/>
-          <a:lstStyle>
-            <a:lvl1pPr>
-              <a:defRPr/>
-            </a:lvl1pPr>
-          </a:lstStyle>
-          <a:p>
-            <a:fld id="{75B40C10-E328-4433-A9A7-F77CB61582A2}" type="slidenum">
-              <a:rPr lang="en-US"/>
+          <a:lstStyle/>
+          <a:p>
+            <a:fld id="{704237C1-FA28-4D2E-A64B-6359CE50665C}" type="slidenum">
+              <a:rPr lang="en-US" smtClean="0"/>
               <a:pPr/>
               <a:t>‹#›</a:t>
             </a:fld>
@@ -2470,12 +2475,13 @@
         <p:spPr/>
         <p:txBody>
           <a:bodyPr/>
-          <a:lstStyle>
-            <a:lvl1pPr>
-              <a:defRPr/>
-            </a:lvl1pPr>
-          </a:lstStyle>
-          <a:p>
+          <a:lstStyle/>
+          <a:p>
+            <a:fld id="{4292FB91-9E56-41B8-B092-BF0841198C0C}" type="datetimeFigureOut">
+              <a:rPr lang="en-US" smtClean="0"/>
+              <a:pPr/>
+              <a:t>6/29/2010</a:t>
+            </a:fld>
             <a:endParaRPr lang="en-US"/>
           </a:p>
         </p:txBody>
@@ -2493,11 +2499,7 @@
         <p:spPr/>
         <p:txBody>
           <a:bodyPr/>
-          <a:lstStyle>
-            <a:lvl1pPr>
-              <a:defRPr/>
-            </a:lvl1pPr>
-          </a:lstStyle>
+          <a:lstStyle/>
           <a:p>
             <a:endParaRPr lang="en-US"/>
           </a:p>
@@ -2516,14 +2518,10 @@
         <p:spPr/>
         <p:txBody>
           <a:bodyPr/>
-          <a:lstStyle>
-            <a:lvl1pPr>
-              <a:defRPr/>
-            </a:lvl1pPr>
-          </a:lstStyle>
-          <a:p>
-            <a:fld id="{3CA2ACFC-BC34-4075-915B-FCC6827C9A58}" type="slidenum">
-              <a:rPr lang="en-US"/>
+          <a:lstStyle/>
+          <a:p>
+            <a:fld id="{704237C1-FA28-4D2E-A64B-6359CE50665C}" type="slidenum">
+              <a:rPr lang="en-US" smtClean="0"/>
               <a:pPr/>
               <a:t>‹#›</a:t>
             </a:fld>
@@ -2543,12 +2541,9 @@
 <p:sldMaster xmlns:a="http://schemas.openxmlformats.org/drawingml/2006/main" xmlns:r="http://schemas.openxmlformats.org/officeDocument/2006/relationships" xmlns:p="http://schemas.openxmlformats.org/presentationml/2006/main">
   <p:cSld>
     <p:bg>
-      <p:bgPr>
-        <a:solidFill>
-          <a:schemeClr val="bg1"/>
-        </a:solidFill>
-        <a:effectLst/>
-      </p:bgPr>
+      <p:bgRef idx="1001">
+        <a:schemeClr val="bg1"/>
+      </p:bgRef>
     </p:bg>
     <p:spTree>
       <p:nvGrpSpPr>
@@ -2566,79 +2561,59 @@
       </p:grpSpPr>
       <p:sp>
         <p:nvSpPr>
-          <p:cNvPr id="1026" name="Rectangle 2"/>
-          <p:cNvSpPr>
-            <a:spLocks noGrp="1" noChangeArrowheads="1"/>
+          <p:cNvPr id="2" name="Title Placeholder 1"/>
+          <p:cNvSpPr>
+            <a:spLocks noGrp="1"/>
           </p:cNvSpPr>
           <p:nvPr>
             <p:ph type="title"/>
           </p:nvPr>
         </p:nvSpPr>
-        <p:spPr bwMode="auto">
+        <p:spPr>
           <a:xfrm>
-            <a:off x="685800" y="609600"/>
-            <a:ext cx="7772400" cy="1143000"/>
+            <a:off x="457200" y="274638"/>
+            <a:ext cx="8229600" cy="1143000"/>
           </a:xfrm>
           <a:prstGeom prst="rect">
             <a:avLst/>
           </a:prstGeom>
-          <a:noFill/>
-          <a:ln w="9525">
-            <a:noFill/>
-            <a:miter lim="800000"/>
-            <a:headEnd/>
-            <a:tailEnd/>
-          </a:ln>
-          <a:effectLst/>
         </p:spPr>
         <p:txBody>
-          <a:bodyPr vert="horz" wrap="square" lIns="91440" tIns="45720" rIns="91440" bIns="45720" numCol="1" anchor="ctr" anchorCtr="0" compatLnSpc="1">
-            <a:prstTxWarp prst="textNoShape">
-              <a:avLst/>
-            </a:prstTxWarp>
+          <a:bodyPr vert="horz" lIns="91440" tIns="45720" rIns="91440" bIns="45720" rtlCol="0" anchor="ctr">
+            <a:normAutofit/>
           </a:bodyPr>
           <a:lstStyle/>
           <a:p>
-            <a:pPr lvl="0"/>
             <a:r>
               <a:rPr lang="en-US" smtClean="0"/>
               <a:t>Click to edit Master title style</a:t>
             </a:r>
-          </a:p>
-        </p:txBody>
-      </p:sp>
-      <p:sp>
-        <p:nvSpPr>
-          <p:cNvPr id="1027" name="Rectangle 3"/>
-          <p:cNvSpPr>
-            <a:spLocks noGrp="1" noChangeArrowheads="1"/>
+            <a:endParaRPr lang="en-US"/>
+          </a:p>
+        </p:txBody>
+      </p:sp>
+      <p:sp>
+        <p:nvSpPr>
+          <p:cNvPr id="3" name="Text Placeholder 2"/>
+          <p:cNvSpPr>
+            <a:spLocks noGrp="1"/>
           </p:cNvSpPr>
           <p:nvPr>
             <p:ph type="body" idx="1"/>
           </p:nvPr>
         </p:nvSpPr>
-        <p:spPr bwMode="auto">
+        <p:spPr>
           <a:xfrm>
-            <a:off x="685800" y="1981200"/>
-            <a:ext cx="7772400" cy="4114800"/>
+            <a:off x="457200" y="1600200"/>
+            <a:ext cx="8229600" cy="4525963"/>
           </a:xfrm>
           <a:prstGeom prst="rect">
             <a:avLst/>
           </a:prstGeom>
-          <a:noFill/>
-          <a:ln w="9525">
-            <a:noFill/>
-            <a:miter lim="800000"/>
-            <a:headEnd/>
-            <a:tailEnd/>
-          </a:ln>
-          <a:effectLst/>
         </p:spPr>
         <p:txBody>
-          <a:bodyPr vert="horz" wrap="square" lIns="91440" tIns="45720" rIns="91440" bIns="45720" numCol="1" anchor="t" anchorCtr="0" compatLnSpc="1">
-            <a:prstTxWarp prst="textNoShape">
-              <a:avLst/>
-            </a:prstTxWarp>
+          <a:bodyPr vert="horz" lIns="91440" tIns="45720" rIns="91440" bIns="45720" rtlCol="0">
+            <a:normAutofit/>
           </a:bodyPr>
           <a:lstStyle/>
           <a:p>
@@ -2675,88 +2650,82 @@
               <a:rPr lang="en-US" smtClean="0"/>
               <a:t>Fifth level</a:t>
             </a:r>
-          </a:p>
-        </p:txBody>
-      </p:sp>
-      <p:sp>
-        <p:nvSpPr>
-          <p:cNvPr id="1028" name="Rectangle 4"/>
-          <p:cNvSpPr>
-            <a:spLocks noGrp="1" noChangeArrowheads="1"/>
+            <a:endParaRPr lang="en-US"/>
+          </a:p>
+        </p:txBody>
+      </p:sp>
+      <p:sp>
+        <p:nvSpPr>
+          <p:cNvPr id="4" name="Date Placeholder 3"/>
+          <p:cNvSpPr>
+            <a:spLocks noGrp="1"/>
           </p:cNvSpPr>
           <p:nvPr>
             <p:ph type="dt" sz="half" idx="2"/>
           </p:nvPr>
         </p:nvSpPr>
-        <p:spPr bwMode="auto">
+        <p:spPr>
           <a:xfrm>
-            <a:off x="685800" y="6248400"/>
-            <a:ext cx="1905000" cy="457200"/>
+            <a:off x="457200" y="6356350"/>
+            <a:ext cx="2133600" cy="365125"/>
           </a:xfrm>
           <a:prstGeom prst="rect">
             <a:avLst/>
           </a:prstGeom>
-          <a:noFill/>
-          <a:ln w="9525">
-            <a:noFill/>
-            <a:miter lim="800000"/>
-            <a:headEnd/>
-            <a:tailEnd/>
-          </a:ln>
-          <a:effectLst/>
         </p:spPr>
         <p:txBody>
-          <a:bodyPr vert="horz" wrap="square" lIns="91440" tIns="45720" rIns="91440" bIns="45720" numCol="1" anchor="t" anchorCtr="0" compatLnSpc="1">
-            <a:prstTxWarp prst="textNoShape">
-              <a:avLst/>
-            </a:prstTxWarp>
-          </a:bodyPr>
+          <a:bodyPr vert="horz" lIns="91440" tIns="45720" rIns="91440" bIns="45720" rtlCol="0" anchor="ctr"/>
           <a:lstStyle>
-            <a:lvl1pPr>
-              <a:defRPr sz="1400"/>
+            <a:lvl1pPr algn="l">
+              <a:defRPr sz="1200">
+                <a:solidFill>
+                  <a:schemeClr val="tx1">
+                    <a:tint val="75000"/>
+                  </a:schemeClr>
+                </a:solidFill>
+              </a:defRPr>
             </a:lvl1pPr>
           </a:lstStyle>
           <a:p>
-            <a:endParaRPr lang="en-US"/>
-          </a:p>
-        </p:txBody>
-      </p:sp>
-      <p:sp>
-        <p:nvSpPr>
-          <p:cNvPr id="1029" name="Rectangle 5"/>
-          <p:cNvSpPr>
-            <a:spLocks noGrp="1" noChangeArrowheads="1"/>
+            <a:fld id="{4292FB91-9E56-41B8-B092-BF0841198C0C}" type="datetimeFigureOut">
+              <a:rPr lang="en-US" smtClean="0"/>
+              <a:pPr/>
+              <a:t>6/29/2010</a:t>
+            </a:fld>
+            <a:endParaRPr lang="en-US"/>
+          </a:p>
+        </p:txBody>
+      </p:sp>
+      <p:sp>
+        <p:nvSpPr>
+          <p:cNvPr id="5" name="Footer Placeholder 4"/>
+          <p:cNvSpPr>
+            <a:spLocks noGrp="1"/>
           </p:cNvSpPr>
           <p:nvPr>
             <p:ph type="ftr" sz="quarter" idx="3"/>
           </p:nvPr>
         </p:nvSpPr>
-        <p:spPr bwMode="auto">
+        <p:spPr>
           <a:xfrm>
-            <a:off x="3124200" y="6248400"/>
-            <a:ext cx="2895600" cy="457200"/>
+            <a:off x="3124200" y="6356350"/>
+            <a:ext cx="2895600" cy="365125"/>
           </a:xfrm>
           <a:prstGeom prst="rect">
             <a:avLst/>
           </a:prstGeom>
-          <a:noFill/>
-          <a:ln w="9525">
-            <a:noFill/>
-            <a:miter lim="800000"/>
-            <a:headEnd/>
-            <a:tailEnd/>
-          </a:ln>
-          <a:effectLst/>
         </p:spPr>
         <p:txBody>
-          <a:bodyPr vert="horz" wrap="square" lIns="91440" tIns="45720" rIns="91440" bIns="45720" numCol="1" anchor="t" anchorCtr="0" compatLnSpc="1">
-            <a:prstTxWarp prst="textNoShape">
-              <a:avLst/>
-            </a:prstTxWarp>
-          </a:bodyPr>
+          <a:bodyPr vert="horz" lIns="91440" tIns="45720" rIns="91440" bIns="45720" rtlCol="0" anchor="ctr"/>
           <a:lstStyle>
             <a:lvl1pPr algn="ctr">
-              <a:defRPr sz="1400"/>
+              <a:defRPr sz="1200">
+                <a:solidFill>
+                  <a:schemeClr val="tx1">
+                    <a:tint val="75000"/>
+                  </a:schemeClr>
+                </a:solidFill>
+              </a:defRPr>
             </a:lvl1pPr>
           </a:lstStyle>
           <a:p>
@@ -2766,45 +2735,39 @@
       </p:sp>
       <p:sp>
         <p:nvSpPr>
-          <p:cNvPr id="1030" name="Rectangle 6"/>
-          <p:cNvSpPr>
-            <a:spLocks noGrp="1" noChangeArrowheads="1"/>
+          <p:cNvPr id="6" name="Slide Number Placeholder 5"/>
+          <p:cNvSpPr>
+            <a:spLocks noGrp="1"/>
           </p:cNvSpPr>
           <p:nvPr>
             <p:ph type="sldNum" sz="quarter" idx="4"/>
           </p:nvPr>
         </p:nvSpPr>
-        <p:spPr bwMode="auto">
+        <p:spPr>
           <a:xfrm>
-            <a:off x="6553200" y="6248400"/>
-            <a:ext cx="1905000" cy="457200"/>
+            <a:off x="6553200" y="6356350"/>
+            <a:ext cx="2133600" cy="365125"/>
           </a:xfrm>
           <a:prstGeom prst="rect">
             <a:avLst/>
           </a:prstGeom>
-          <a:noFill/>
-          <a:ln w="9525">
-            <a:noFill/>
-            <a:miter lim="800000"/>
-            <a:headEnd/>
-            <a:tailEnd/>
-          </a:ln>
-          <a:effectLst/>
         </p:spPr>
         <p:txBody>
-          <a:bodyPr vert="horz" wrap="square" lIns="91440" tIns="45720" rIns="91440" bIns="45720" numCol="1" anchor="t" anchorCtr="0" compatLnSpc="1">
-            <a:prstTxWarp prst="textNoShape">
-              <a:avLst/>
-            </a:prstTxWarp>
-          </a:bodyPr>
+          <a:bodyPr vert="horz" lIns="91440" tIns="45720" rIns="91440" bIns="45720" rtlCol="0" anchor="ctr"/>
           <a:lstStyle>
             <a:lvl1pPr algn="r">
-              <a:defRPr sz="1400"/>
+              <a:defRPr sz="1200">
+                <a:solidFill>
+                  <a:schemeClr val="tx1">
+                    <a:tint val="75000"/>
+                  </a:schemeClr>
+                </a:solidFill>
+              </a:defRPr>
             </a:lvl1pPr>
           </a:lstStyle>
           <a:p>
-            <a:fld id="{2C6490CD-1A4A-497B-BCF4-CCDC5B309001}" type="slidenum">
-              <a:rPr lang="en-US"/>
+            <a:fld id="{704237C1-FA28-4D2E-A64B-6359CE50665C}" type="slidenum">
+              <a:rPr lang="en-US" smtClean="0"/>
               <a:pPr/>
               <a:t>‹#›</a:t>
             </a:fld>
@@ -2830,145 +2793,29 @@
   </p:sldLayoutIdLst>
   <p:txStyles>
     <p:titleStyle>
-      <a:lvl1pPr algn="ctr" rtl="0" fontAlgn="base">
+      <a:lvl1pPr algn="ctr" defTabSz="914400" rtl="0" eaLnBrk="1" latinLnBrk="0" hangingPunct="1">
         <a:spcBef>
           <a:spcPct val="0"/>
         </a:spcBef>
-        <a:spcAft>
-          <a:spcPct val="0"/>
-        </a:spcAft>
-        <a:defRPr sz="4400">
+        <a:buNone/>
+        <a:defRPr sz="4400" kern="1200">
           <a:solidFill>
-            <a:schemeClr val="tx2"/>
+            <a:schemeClr val="tx1"/>
           </a:solidFill>
           <a:latin typeface="+mj-lt"/>
           <a:ea typeface="+mj-ea"/>
           <a:cs typeface="+mj-cs"/>
         </a:defRPr>
       </a:lvl1pPr>
-      <a:lvl2pPr algn="ctr" rtl="0" fontAlgn="base">
-        <a:spcBef>
-          <a:spcPct val="0"/>
-        </a:spcBef>
-        <a:spcAft>
-          <a:spcPct val="0"/>
-        </a:spcAft>
-        <a:defRPr sz="4400">
-          <a:solidFill>
-            <a:schemeClr val="tx2"/>
-          </a:solidFill>
-          <a:latin typeface="Times"/>
-        </a:defRPr>
-      </a:lvl2pPr>
-      <a:lvl3pPr algn="ctr" rtl="0" fontAlgn="base">
-        <a:spcBef>
-          <a:spcPct val="0"/>
-        </a:spcBef>
-        <a:spcAft>
-          <a:spcPct val="0"/>
-        </a:spcAft>
-        <a:defRPr sz="4400">
-          <a:solidFill>
-            <a:schemeClr val="tx2"/>
-          </a:solidFill>
-          <a:latin typeface="Times"/>
-        </a:defRPr>
-      </a:lvl3pPr>
-      <a:lvl4pPr algn="ctr" rtl="0" fontAlgn="base">
-        <a:spcBef>
-          <a:spcPct val="0"/>
-        </a:spcBef>
-        <a:spcAft>
-          <a:spcPct val="0"/>
-        </a:spcAft>
-        <a:defRPr sz="4400">
-          <a:solidFill>
-            <a:schemeClr val="tx2"/>
-          </a:solidFill>
-          <a:latin typeface="Times"/>
-        </a:defRPr>
-      </a:lvl4pPr>
-      <a:lvl5pPr algn="ctr" rtl="0" fontAlgn="base">
-        <a:spcBef>
-          <a:spcPct val="0"/>
-        </a:spcBef>
-        <a:spcAft>
-          <a:spcPct val="0"/>
-        </a:spcAft>
-        <a:defRPr sz="4400">
-          <a:solidFill>
-            <a:schemeClr val="tx2"/>
-          </a:solidFill>
-          <a:latin typeface="Times"/>
-        </a:defRPr>
-      </a:lvl5pPr>
-      <a:lvl6pPr marL="457200" algn="ctr" rtl="0" fontAlgn="base">
-        <a:spcBef>
-          <a:spcPct val="0"/>
-        </a:spcBef>
-        <a:spcAft>
-          <a:spcPct val="0"/>
-        </a:spcAft>
-        <a:defRPr sz="4400">
-          <a:solidFill>
-            <a:schemeClr val="tx2"/>
-          </a:solidFill>
-          <a:latin typeface="Times"/>
-        </a:defRPr>
-      </a:lvl6pPr>
-      <a:lvl7pPr marL="914400" algn="ctr" rtl="0" fontAlgn="base">
-        <a:spcBef>
-          <a:spcPct val="0"/>
-        </a:spcBef>
-        <a:spcAft>
-          <a:spcPct val="0"/>
-        </a:spcAft>
-        <a:defRPr sz="4400">
-          <a:solidFill>
-            <a:schemeClr val="tx2"/>
-          </a:solidFill>
-          <a:latin typeface="Times"/>
-        </a:defRPr>
-      </a:lvl7pPr>
-      <a:lvl8pPr marL="1371600" algn="ctr" rtl="0" fontAlgn="base">
-        <a:spcBef>
-          <a:spcPct val="0"/>
-        </a:spcBef>
-        <a:spcAft>
-          <a:spcPct val="0"/>
-        </a:spcAft>
-        <a:defRPr sz="4400">
-          <a:solidFill>
-            <a:schemeClr val="tx2"/>
-          </a:solidFill>
-          <a:latin typeface="Times"/>
-        </a:defRPr>
-      </a:lvl8pPr>
-      <a:lvl9pPr marL="1828800" algn="ctr" rtl="0" fontAlgn="base">
-        <a:spcBef>
-          <a:spcPct val="0"/>
-        </a:spcBef>
-        <a:spcAft>
-          <a:spcPct val="0"/>
-        </a:spcAft>
-        <a:defRPr sz="4400">
-          <a:solidFill>
-            <a:schemeClr val="tx2"/>
-          </a:solidFill>
-          <a:latin typeface="Times"/>
-        </a:defRPr>
-      </a:lvl9pPr>
     </p:titleStyle>
     <p:bodyStyle>
-      <a:lvl1pPr marL="342900" indent="-342900" algn="l" rtl="0" fontAlgn="base">
+      <a:lvl1pPr marL="342900" indent="-342900" algn="l" defTabSz="914400" rtl="0" eaLnBrk="1" latinLnBrk="0" hangingPunct="1">
         <a:spcBef>
           <a:spcPct val="20000"/>
         </a:spcBef>
-        <a:spcAft>
-          <a:spcPct val="0"/>
-        </a:spcAft>
+        <a:buFont typeface="Arial" pitchFamily="34" charset="0"/>
         <a:buChar char="•"/>
-        <a:defRPr sz="3200">
+        <a:defRPr sz="3200" kern="1200">
           <a:solidFill>
             <a:schemeClr val="tx1"/>
           </a:solidFill>
@@ -2977,124 +2824,124 @@
           <a:cs typeface="+mn-cs"/>
         </a:defRPr>
       </a:lvl1pPr>
-      <a:lvl2pPr marL="742950" indent="-285750" algn="l" rtl="0" fontAlgn="base">
+      <a:lvl2pPr marL="742950" indent="-285750" algn="l" defTabSz="914400" rtl="0" eaLnBrk="1" latinLnBrk="0" hangingPunct="1">
         <a:spcBef>
           <a:spcPct val="20000"/>
         </a:spcBef>
-        <a:spcAft>
-          <a:spcPct val="0"/>
-        </a:spcAft>
+        <a:buFont typeface="Arial" pitchFamily="34" charset="0"/>
         <a:buChar char="–"/>
-        <a:defRPr sz="2800">
+        <a:defRPr sz="2800" kern="1200">
           <a:solidFill>
             <a:schemeClr val="tx1"/>
           </a:solidFill>
           <a:latin typeface="+mn-lt"/>
+          <a:ea typeface="+mn-ea"/>
+          <a:cs typeface="+mn-cs"/>
         </a:defRPr>
       </a:lvl2pPr>
-      <a:lvl3pPr marL="1143000" indent="-228600" algn="l" rtl="0" fontAlgn="base">
+      <a:lvl3pPr marL="1143000" indent="-228600" algn="l" defTabSz="914400" rtl="0" eaLnBrk="1" latinLnBrk="0" hangingPunct="1">
         <a:spcBef>
           <a:spcPct val="20000"/>
         </a:spcBef>
-        <a:spcAft>
-          <a:spcPct val="0"/>
-        </a:spcAft>
+        <a:buFont typeface="Arial" pitchFamily="34" charset="0"/>
         <a:buChar char="•"/>
-        <a:defRPr sz="2400">
+        <a:defRPr sz="2400" kern="1200">
           <a:solidFill>
             <a:schemeClr val="tx1"/>
           </a:solidFill>
           <a:latin typeface="+mn-lt"/>
+          <a:ea typeface="+mn-ea"/>
+          <a:cs typeface="+mn-cs"/>
         </a:defRPr>
       </a:lvl3pPr>
-      <a:lvl4pPr marL="1600200" indent="-228600" algn="l" rtl="0" fontAlgn="base">
+      <a:lvl4pPr marL="1600200" indent="-228600" algn="l" defTabSz="914400" rtl="0" eaLnBrk="1" latinLnBrk="0" hangingPunct="1">
         <a:spcBef>
           <a:spcPct val="20000"/>
         </a:spcBef>
-        <a:spcAft>
-          <a:spcPct val="0"/>
-        </a:spcAft>
+        <a:buFont typeface="Arial" pitchFamily="34" charset="0"/>
         <a:buChar char="–"/>
-        <a:defRPr sz="2000">
+        <a:defRPr sz="2000" kern="1200">
           <a:solidFill>
             <a:schemeClr val="tx1"/>
           </a:solidFill>
           <a:latin typeface="+mn-lt"/>
+          <a:ea typeface="+mn-ea"/>
+          <a:cs typeface="+mn-cs"/>
         </a:defRPr>
       </a:lvl4pPr>
-      <a:lvl5pPr marL="2057400" indent="-228600" algn="l" rtl="0" fontAlgn="base">
+      <a:lvl5pPr marL="2057400" indent="-228600" algn="l" defTabSz="914400" rtl="0" eaLnBrk="1" latinLnBrk="0" hangingPunct="1">
         <a:spcBef>
           <a:spcPct val="20000"/>
         </a:spcBef>
-        <a:spcAft>
-          <a:spcPct val="0"/>
-        </a:spcAft>
+        <a:buFont typeface="Arial" pitchFamily="34" charset="0"/>
         <a:buChar char="»"/>
-        <a:defRPr sz="2000">
+        <a:defRPr sz="2000" kern="1200">
           <a:solidFill>
             <a:schemeClr val="tx1"/>
           </a:solidFill>
           <a:latin typeface="+mn-lt"/>
+          <a:ea typeface="+mn-ea"/>
+          <a:cs typeface="+mn-cs"/>
         </a:defRPr>
       </a:lvl5pPr>
-      <a:lvl6pPr marL="2514600" indent="-228600" algn="l" rtl="0" fontAlgn="base">
+      <a:lvl6pPr marL="2514600" indent="-228600" algn="l" defTabSz="914400" rtl="0" eaLnBrk="1" latinLnBrk="0" hangingPunct="1">
         <a:spcBef>
           <a:spcPct val="20000"/>
         </a:spcBef>
-        <a:spcAft>
-          <a:spcPct val="0"/>
-        </a:spcAft>
-        <a:buChar char="»"/>
-        <a:defRPr sz="2000">
+        <a:buFont typeface="Arial" pitchFamily="34" charset="0"/>
+        <a:buChar char="•"/>
+        <a:defRPr sz="2000" kern="1200">
           <a:solidFill>
             <a:schemeClr val="tx1"/>
           </a:solidFill>
           <a:latin typeface="+mn-lt"/>
+          <a:ea typeface="+mn-ea"/>
+          <a:cs typeface="+mn-cs"/>
         </a:defRPr>
       </a:lvl6pPr>
-      <a:lvl7pPr marL="2971800" indent="-228600" algn="l" rtl="0" fontAlgn="base">
+      <a:lvl7pPr marL="2971800" indent="-228600" algn="l" defTabSz="914400" rtl="0" eaLnBrk="1" latinLnBrk="0" hangingPunct="1">
         <a:spcBef>
           <a:spcPct val="20000"/>
         </a:spcBef>
-        <a:spcAft>
-          <a:spcPct val="0"/>
-        </a:spcAft>
-        <a:buChar char="»"/>
-        <a:defRPr sz="2000">
+        <a:buFont typeface="Arial" pitchFamily="34" charset="0"/>
+        <a:buChar char="•"/>
+        <a:defRPr sz="2000" kern="1200">
           <a:solidFill>
             <a:schemeClr val="tx1"/>
           </a:solidFill>
           <a:latin typeface="+mn-lt"/>
+          <a:ea typeface="+mn-ea"/>
+          <a:cs typeface="+mn-cs"/>
         </a:defRPr>
       </a:lvl7pPr>
-      <a:lvl8pPr marL="3429000" indent="-228600" algn="l" rtl="0" fontAlgn="base">
+      <a:lvl8pPr marL="3429000" indent="-228600" algn="l" defTabSz="914400" rtl="0" eaLnBrk="1" latinLnBrk="0" hangingPunct="1">
         <a:spcBef>
           <a:spcPct val="20000"/>
         </a:spcBef>
-        <a:spcAft>
-          <a:spcPct val="0"/>
-        </a:spcAft>
-        <a:buChar char="»"/>
-        <a:defRPr sz="2000">
+        <a:buFont typeface="Arial" pitchFamily="34" charset="0"/>
+        <a:buChar char="•"/>
+        <a:defRPr sz="2000" kern="1200">
           <a:solidFill>
             <a:schemeClr val="tx1"/>
           </a:solidFill>
           <a:latin typeface="+mn-lt"/>
+          <a:ea typeface="+mn-ea"/>
+          <a:cs typeface="+mn-cs"/>
         </a:defRPr>
       </a:lvl8pPr>
-      <a:lvl9pPr marL="3886200" indent="-228600" algn="l" rtl="0" fontAlgn="base">
+      <a:lvl9pPr marL="3886200" indent="-228600" algn="l" defTabSz="914400" rtl="0" eaLnBrk="1" latinLnBrk="0" hangingPunct="1">
         <a:spcBef>
           <a:spcPct val="20000"/>
         </a:spcBef>
-        <a:spcAft>
-          <a:spcPct val="0"/>
-        </a:spcAft>
-        <a:buChar char="»"/>
-        <a:defRPr sz="2000">
+        <a:buFont typeface="Arial" pitchFamily="34" charset="0"/>
+        <a:buChar char="•"/>
+        <a:defRPr sz="2000" kern="1200">
           <a:solidFill>
             <a:schemeClr val="tx1"/>
           </a:solidFill>
           <a:latin typeface="+mn-lt"/>
+          <a:ea typeface="+mn-ea"/>
+          <a:cs typeface="+mn-cs"/>
         </a:defRPr>
       </a:lvl9pPr>
     </p:bodyStyle>
@@ -3216,62 +3063,308 @@
       </p:grpSpPr>
       <p:sp>
         <p:nvSpPr>
-          <p:cNvPr id="2050" name="Rectangle 2"/>
-          <p:cNvSpPr>
-            <a:spLocks noGrp="1" noChangeArrowheads="1"/>
+          <p:cNvPr id="2" name="Title 1"/>
+          <p:cNvSpPr>
+            <a:spLocks noGrp="1"/>
           </p:cNvSpPr>
           <p:nvPr>
             <p:ph type="ctrTitle"/>
           </p:nvPr>
         </p:nvSpPr>
-        <p:spPr>
-          <a:xfrm>
-            <a:off x="685800" y="2286000"/>
-            <a:ext cx="7772400" cy="1143000"/>
-          </a:xfrm>
-        </p:spPr>
-        <p:txBody>
-          <a:bodyPr/>
-          <a:lstStyle/>
-          <a:p>
+        <p:spPr/>
+        <p:txBody>
+          <a:bodyPr/>
+          <a:lstStyle/>
+          <a:p>
+            <a:r>
+              <a:rPr lang="en-US" dirty="0" smtClean="0"/>
+              <a:t>Attachment Test</a:t>
+            </a:r>
+            <a:endParaRPr lang="en-US" dirty="0"/>
+          </a:p>
+        </p:txBody>
+      </p:sp>
+      <p:sp>
+        <p:nvSpPr>
+          <p:cNvPr id="3" name="Subtitle 2"/>
+          <p:cNvSpPr>
+            <a:spLocks noGrp="1"/>
+          </p:cNvSpPr>
+          <p:nvPr>
+            <p:ph type="subTitle" idx="1"/>
+          </p:nvPr>
+        </p:nvSpPr>
+        <p:spPr/>
+        <p:txBody>
+          <a:bodyPr/>
+          <a:lstStyle/>
+          <a:p>
+            <a:r>
+              <a:rPr lang="en-US" dirty="0" smtClean="0"/>
+              <a:t>Rajiv</a:t>
+            </a:r>
+            <a:endParaRPr lang="en-US" dirty="0"/>
+          </a:p>
+        </p:txBody>
+      </p:sp>
+    </p:spTree>
+  </p:cSld>
+  <p:clrMapOvr>
+    <a:masterClrMapping/>
+  </p:clrMapOvr>
+</p:sld>
+</file>
+
+<file path=ppt/slides/slide2.xml><?xml version="1.0" encoding="utf-8"?>
+<p:sld xmlns:a="http://schemas.openxmlformats.org/drawingml/2006/main" xmlns:r="http://schemas.openxmlformats.org/officeDocument/2006/relationships" xmlns:p="http://schemas.openxmlformats.org/presentationml/2006/main">
+  <p:cSld>
+    <p:spTree>
+      <p:nvGrpSpPr>
+        <p:cNvPr id="1" name=""/>
+        <p:cNvGrpSpPr/>
+        <p:nvPr/>
+      </p:nvGrpSpPr>
+      <p:grpSpPr>
+        <a:xfrm>
+          <a:off x="0" y="0"/>
+          <a:ext cx="0" cy="0"/>
+          <a:chOff x="0" y="0"/>
+          <a:chExt cx="0" cy="0"/>
+        </a:xfrm>
+      </p:grpSpPr>
+      <p:sp>
+        <p:nvSpPr>
+          <p:cNvPr id="2" name="Title 1"/>
+          <p:cNvSpPr>
+            <a:spLocks noGrp="1"/>
+          </p:cNvSpPr>
+          <p:nvPr>
+            <p:ph type="title"/>
+          </p:nvPr>
+        </p:nvSpPr>
+        <p:spPr/>
+        <p:txBody>
+          <a:bodyPr/>
+          <a:lstStyle/>
+          <a:p>
+            <a:endParaRPr lang="en-US" dirty="0"/>
+          </a:p>
+        </p:txBody>
+      </p:sp>
+      <p:sp>
+        <p:nvSpPr>
+          <p:cNvPr id="3" name="Content Placeholder 2"/>
+          <p:cNvSpPr>
+            <a:spLocks noGrp="1"/>
+          </p:cNvSpPr>
+          <p:nvPr>
+            <p:ph idx="1"/>
+          </p:nvPr>
+        </p:nvSpPr>
+        <p:spPr/>
+        <p:txBody>
+          <a:bodyPr>
+            <a:normAutofit/>
+          </a:bodyPr>
+          <a:lstStyle/>
+          <a:p>
+            <a:pPr>
+              <a:buNone/>
+            </a:pPr>
+            <a:r>
+              <a:rPr lang="en-US" dirty="0"/>
+              <a:t>This is a test file data with the same content as every other file being tested for </a:t>
+            </a:r>
+            <a:r>
+              <a:rPr lang="en-US" dirty="0" err="1"/>
+              <a:t>tika</a:t>
+            </a:r>
+            <a:r>
+              <a:rPr lang="en-US" dirty="0"/>
+              <a:t> content parsing. This has been developed by Rajiv </a:t>
+            </a:r>
             <a:r>
               <a:rPr lang="en-US"/>
-              <a:t>Sample Powerpoint Slide</a:t>
-            </a:r>
-          </a:p>
-        </p:txBody>
-      </p:sp>
-      <p:sp>
-        <p:nvSpPr>
-          <p:cNvPr id="2051" name="Rectangle 3"/>
-          <p:cNvSpPr>
-            <a:spLocks noGrp="1" noChangeArrowheads="1"/>
-          </p:cNvSpPr>
-          <p:nvPr>
-            <p:ph type="subTitle" idx="1"/>
-          </p:nvPr>
-        </p:nvSpPr>
-        <p:spPr/>
-        <p:txBody>
-          <a:bodyPr/>
-          <a:lstStyle/>
-          <a:p>
-            <a:r>
-              <a:rPr lang="en-US"/>
-              <a:t>Created with Microsoft </a:t>
-            </a:r>
-          </a:p>
-          <a:p>
-            <a:r>
-              <a:rPr lang="en-US"/>
-              <a:t>Powerpoint X for Mac</a:t>
-            </a:r>
-          </a:p>
-          <a:p>
-            <a:r>
-              <a:rPr lang="en-US"/>
-              <a:t>Service Release 1</a:t>
-            </a:r>
+              <a:t>Kumar </a:t>
+            </a:r>
+            <a:r>
+              <a:rPr lang="en-US" smtClean="0"/>
+              <a:t>Nistala.</a:t>
+            </a:r>
+            <a:endParaRPr lang="en-US" dirty="0"/>
+          </a:p>
+          <a:p>
+            <a:pPr>
+              <a:buNone/>
+            </a:pPr>
+            <a:r>
+              <a:rPr lang="en-US" dirty="0"/>
+              <a:t> </a:t>
+            </a:r>
+          </a:p>
+          <a:p>
+            <a:pPr>
+              <a:buNone/>
+            </a:pPr>
+            <a:endParaRPr lang="en-US" dirty="0"/>
+          </a:p>
+        </p:txBody>
+      </p:sp>
+    </p:spTree>
+  </p:cSld>
+  <p:clrMapOvr>
+    <a:masterClrMapping/>
+  </p:clrMapOvr>
+</p:sld>
+</file>
+
+<file path=ppt/slides/slide3.xml><?xml version="1.0" encoding="utf-8"?>
+<p:sld xmlns:a="http://schemas.openxmlformats.org/drawingml/2006/main" xmlns:r="http://schemas.openxmlformats.org/officeDocument/2006/relationships" xmlns:p="http://schemas.openxmlformats.org/presentationml/2006/main">
+  <p:cSld>
+    <p:spTree>
+      <p:nvGrpSpPr>
+        <p:cNvPr id="1" name=""/>
+        <p:cNvGrpSpPr/>
+        <p:nvPr/>
+      </p:nvGrpSpPr>
+      <p:grpSpPr>
+        <a:xfrm>
+          <a:off x="0" y="0"/>
+          <a:ext cx="0" cy="0"/>
+          <a:chOff x="0" y="0"/>
+          <a:chExt cx="0" cy="0"/>
+        </a:xfrm>
+      </p:grpSpPr>
+      <p:sp>
+        <p:nvSpPr>
+          <p:cNvPr id="2" name="Title 1"/>
+          <p:cNvSpPr>
+            <a:spLocks noGrp="1"/>
+          </p:cNvSpPr>
+          <p:nvPr>
+            <p:ph type="title"/>
+          </p:nvPr>
+        </p:nvSpPr>
+        <p:spPr/>
+        <p:txBody>
+          <a:bodyPr/>
+          <a:lstStyle/>
+          <a:p>
+            <a:endParaRPr lang="en-US"/>
+          </a:p>
+        </p:txBody>
+      </p:sp>
+      <p:sp>
+        <p:nvSpPr>
+          <p:cNvPr id="3" name="Content Placeholder 2"/>
+          <p:cNvSpPr>
+            <a:spLocks noGrp="1"/>
+          </p:cNvSpPr>
+          <p:nvPr>
+            <p:ph idx="1"/>
+          </p:nvPr>
+        </p:nvSpPr>
+        <p:spPr/>
+        <p:txBody>
+          <a:bodyPr>
+            <a:normAutofit fontScale="85000" lnSpcReduction="20000"/>
+          </a:bodyPr>
+          <a:lstStyle/>
+          <a:p>
+            <a:pPr>
+              <a:buNone/>
+            </a:pPr>
+            <a:r>
+              <a:rPr lang="en-US" dirty="0" smtClean="0"/>
+              <a:t>Different words to test against</a:t>
+            </a:r>
+          </a:p>
+          <a:p>
+            <a:pPr>
+              <a:buNone/>
+            </a:pPr>
+            <a:r>
+              <a:rPr lang="en-US" dirty="0" smtClean="0"/>
+              <a:t> </a:t>
+            </a:r>
+          </a:p>
+          <a:p>
+            <a:pPr>
+              <a:buNone/>
+            </a:pPr>
+            <a:r>
+              <a:rPr lang="en-US" dirty="0" smtClean="0"/>
+              <a:t>Quest</a:t>
+            </a:r>
+          </a:p>
+          <a:p>
+            <a:pPr>
+              <a:buNone/>
+            </a:pPr>
+            <a:r>
+              <a:rPr lang="en-US" dirty="0" smtClean="0"/>
+              <a:t>Hello</a:t>
+            </a:r>
+          </a:p>
+          <a:p>
+            <a:pPr>
+              <a:buNone/>
+            </a:pPr>
+            <a:r>
+              <a:rPr lang="en-US" dirty="0" smtClean="0"/>
+              <a:t>Watershed</a:t>
+            </a:r>
+          </a:p>
+          <a:p>
+            <a:pPr>
+              <a:buNone/>
+            </a:pPr>
+            <a:r>
+              <a:rPr lang="en-US" dirty="0" smtClean="0"/>
+              <a:t>Avalanche</a:t>
+            </a:r>
+          </a:p>
+          <a:p>
+            <a:pPr>
+              <a:buNone/>
+            </a:pPr>
+            <a:r>
+              <a:rPr lang="en-US" dirty="0" smtClean="0"/>
+              <a:t>Black Panther</a:t>
+            </a:r>
+          </a:p>
+          <a:p>
+            <a:pPr>
+              <a:buNone/>
+            </a:pPr>
+            <a:r>
+              <a:rPr lang="en-US" dirty="0" smtClean="0"/>
+              <a:t>Mystery</a:t>
+            </a:r>
+          </a:p>
+          <a:p>
+            <a:pPr>
+              <a:buNone/>
+            </a:pPr>
+            <a:r>
+              <a:rPr lang="en-US" dirty="0" smtClean="0"/>
+              <a:t>Banking</a:t>
+            </a:r>
+          </a:p>
+          <a:p>
+            <a:pPr>
+              <a:buNone/>
+            </a:pPr>
+            <a:r>
+              <a:rPr lang="en-US" smtClean="0"/>
+              <a:t>Investment</a:t>
+            </a:r>
+          </a:p>
+          <a:p>
+            <a:pPr>
+              <a:buNone/>
+            </a:pPr>
+            <a:endParaRPr lang="en-US" dirty="0"/>
           </a:p>
         </p:txBody>
       </p:sp>
@@ -3284,56 +3377,114 @@
 </file>
 
 <file path=ppt/theme/theme1.xml><?xml version="1.0" encoding="utf-8"?>
-<a:theme xmlns:a="http://schemas.openxmlformats.org/drawingml/2006/main" name="Blank Presentation">
+<a:theme xmlns:a="http://schemas.openxmlformats.org/drawingml/2006/main" name="Office Theme">
   <a:themeElements>
-    <a:clrScheme name="Blank Presentation 1">
+    <a:clrScheme name="Office">
       <a:dk1>
-        <a:srgbClr val="000000"/>
+        <a:sysClr val="windowText" lastClr="000000"/>
       </a:dk1>
       <a:lt1>
-        <a:srgbClr val="FFFFFF"/>
+        <a:sysClr val="window" lastClr="FFFFFF"/>
       </a:lt1>
       <a:dk2>
-        <a:srgbClr val="000000"/>
+        <a:srgbClr val="1F497D"/>
       </a:dk2>
       <a:lt2>
-        <a:srgbClr val="808080"/>
+        <a:srgbClr val="EEECE1"/>
       </a:lt2>
       <a:accent1>
-        <a:srgbClr val="BBE0E3"/>
+        <a:srgbClr val="4F81BD"/>
       </a:accent1>
       <a:accent2>
-        <a:srgbClr val="333399"/>
+        <a:srgbClr val="C0504D"/>
       </a:accent2>
       <a:accent3>
-        <a:srgbClr val="FFFFFF"/>
+        <a:srgbClr val="9BBB59"/>
       </a:accent3>
       <a:accent4>
-        <a:srgbClr val="000000"/>
+        <a:srgbClr val="8064A2"/>
       </a:accent4>
       <a:accent5>
-        <a:srgbClr val="DAEDEF"/>
+        <a:srgbClr val="4BACC6"/>
       </a:accent5>
       <a:accent6>
-        <a:srgbClr val="2D2D8A"/>
+        <a:srgbClr val="F79646"/>
       </a:accent6>
       <a:hlink>
-        <a:srgbClr val="009999"/>
+        <a:srgbClr val="0000FF"/>
       </a:hlink>
       <a:folHlink>
-        <a:srgbClr val="99CC00"/>
+        <a:srgbClr val="800080"/>
       </a:folHlink>
     </a:clrScheme>
-    <a:fontScheme name="Blank Presentation">
+    <a:fontScheme name="Office">
       <a:majorFont>
-        <a:latin typeface="Times"/>
+        <a:latin typeface="Calibri"/>
         <a:ea typeface=""/>
         <a:cs typeface=""/>
+        <a:font script="Jpan" typeface="ＭＳ Ｐゴシック"/>
+        <a:font script="Hang" typeface="맑은 고딕"/>
+        <a:font script="Hans" typeface="宋体"/>
+        <a:font script="Hant" typeface="新細明體"/>
+        <a:font script="Arab" typeface="Times New Roman"/>
+        <a:font script="Hebr" typeface="Times New Roman"/>
+        <a:font script="Thai" typeface="Angsana New"/>
+        <a:font script="Ethi" typeface="Nyala"/>
+        <a:font script="Beng" typeface="Vrinda"/>
+        <a:font script="Gujr" typeface="Shruti"/>
+        <a:font script="Khmr" typeface="MoolBoran"/>
+        <a:font script="Knda" typeface="Tunga"/>
+        <a:font script="Guru" typeface="Raavi"/>
+        <a:font script="Cans" typeface="Euphemia"/>
+        <a:font script="Cher" typeface="Plantagenet Cherokee"/>
+        <a:font script="Yiii" typeface="Microsoft Yi Baiti"/>
+        <a:font script="Tibt" typeface="Microsoft Himalaya"/>
+        <a:font script="Thaa" typeface="MV Boli"/>
+        <a:font script="Deva" typeface="Mangal"/>
+        <a:font script="Telu" typeface="Gautami"/>
+        <a:font script="Taml" typeface="Latha"/>
+        <a:font script="Syrc" typeface="Estrangelo Edessa"/>
+        <a:font script="Orya" typeface="Kalinga"/>
+        <a:font script="Mlym" typeface="Kartika"/>
+        <a:font script="Laoo" typeface="DokChampa"/>
+        <a:font script="Sinh" typeface="Iskoola Pota"/>
+        <a:font script="Mong" typeface="Mongolian Baiti"/>
+        <a:font script="Viet" typeface="Times New Roman"/>
+        <a:font script="Uigh" typeface="Microsoft Uighur"/>
       </a:majorFont>
       <a:minorFont>
-        <a:latin typeface="Times"/>
+        <a:latin typeface="Calibri"/>
         <a:ea typeface=""/>
         <a:cs typeface=""/>
+        <a:font script="Jpan" typeface="ＭＳ Ｐゴシック"/>
+        <a:font script="Hang" typeface="맑은 고딕"/>
+        <a:font script="Hans" typeface="宋体"/>
+        <a:font script="Hant" typeface="新細明體"/>
+        <a:font script="Arab" typeface="Arial"/>
+        <a:font script="Hebr" typeface="Arial"/>
+        <a:font script="Thai" typeface="Cordia New"/>
+        <a:font script="Ethi" typeface="Nyala"/>
+        <a:font script="Beng" typeface="Vrinda"/>
+        <a:font script="Gujr" typeface="Shruti"/>
+        <a:font script="Khmr" typeface="DaunPenh"/>
+        <a:font script="Knda" typeface="Tunga"/>
+        <a:font script="Guru" typeface="Raavi"/>
+        <a:font script="Cans" typeface="Euphemia"/>
+        <a:font script="Cher" typeface="Plantagenet Cherokee"/>
+        <a:font script="Yiii" typeface="Microsoft Yi Baiti"/>
+        <a:font script="Tibt" typeface="Microsoft Himalaya"/>
+        <a:font script="Thaa" typeface="MV Boli"/>
+        <a:font script="Deva" typeface="Mangal"/>
+        <a:font script="Telu" typeface="Gautami"/>
+        <a:font script="Taml" typeface="Latha"/>
+        <a:font script="Syrc" typeface="Estrangelo Edessa"/>
+        <a:font script="Orya" typeface="Kalinga"/>
+        <a:font script="Mlym" typeface="Kartika"/>
+        <a:font script="Laoo" typeface="DokChampa"/>
+        <a:font script="Sinh" typeface="Iskoola Pota"/>
+        <a:font script="Mong" typeface="Mongolian Baiti"/>
+        <a:font script="Viet" typeface="Arial"/>
+        <a:font script="Uigh" typeface="Microsoft Uighur"/>
       </a:minorFont>
     </a:fontScheme>
     <a:fmtScheme name="Office">
@@ -3503,625 +3654,7 @@
       </a:bgFillStyleLst>
     </a:fmtScheme>
   </a:themeElements>
-  <a:objectDefaults>
-    <a:spDef>
-      <a:spPr bwMode="auto">
-        <a:xfrm>
-          <a:off x="0" y="0"/>
-          <a:ext cx="1" cy="1"/>
-        </a:xfrm>
-        <a:custGeom>
-          <a:avLst/>
-          <a:gdLst/>
-          <a:ahLst/>
-          <a:cxnLst/>
-          <a:rect l="0" t="0" r="0" b="0"/>
-          <a:pathLst/>
-        </a:custGeom>
-        <a:solidFill>
-          <a:schemeClr val="accent1"/>
-        </a:solidFill>
-        <a:ln w="9525" cap="flat" cmpd="sng" algn="ctr">
-          <a:solidFill>
-            <a:schemeClr val="tx1"/>
-          </a:solidFill>
-          <a:prstDash val="solid"/>
-          <a:round/>
-          <a:headEnd type="none" w="med" len="med"/>
-          <a:tailEnd type="none" w="med" len="med"/>
-        </a:ln>
-        <a:effectLst/>
-      </a:spPr>
-      <a:bodyPr vert="horz" wrap="square" lIns="91440" tIns="45720" rIns="91440" bIns="45720" numCol="1" anchor="t" anchorCtr="0" compatLnSpc="1">
-        <a:prstTxWarp prst="textNoShape">
-          <a:avLst/>
-        </a:prstTxWarp>
-      </a:bodyPr>
-      <a:lstStyle>
-        <a:defPPr marL="0" marR="0" indent="0" algn="l" defTabSz="914400" rtl="0" eaLnBrk="0" fontAlgn="base" latinLnBrk="0" hangingPunct="0">
-          <a:lnSpc>
-            <a:spcPct val="100000"/>
-          </a:lnSpc>
-          <a:spcBef>
-            <a:spcPct val="0"/>
-          </a:spcBef>
-          <a:spcAft>
-            <a:spcPct val="0"/>
-          </a:spcAft>
-          <a:buClrTx/>
-          <a:buSzTx/>
-          <a:buFontTx/>
-          <a:buNone/>
-          <a:tabLst/>
-          <a:defRPr kumimoji="0" lang="en-US" sz="2400" b="0" i="0" u="none" strike="noStrike" cap="none" normalizeH="0" baseline="0" smtClean="0">
-            <a:ln>
-              <a:noFill/>
-            </a:ln>
-            <a:solidFill>
-              <a:schemeClr val="tx1"/>
-            </a:solidFill>
-            <a:effectLst/>
-            <a:latin typeface="Times"/>
-          </a:defRPr>
-        </a:defPPr>
-      </a:lstStyle>
-    </a:spDef>
-    <a:lnDef>
-      <a:spPr bwMode="auto">
-        <a:xfrm>
-          <a:off x="0" y="0"/>
-          <a:ext cx="1" cy="1"/>
-        </a:xfrm>
-        <a:custGeom>
-          <a:avLst/>
-          <a:gdLst/>
-          <a:ahLst/>
-          <a:cxnLst/>
-          <a:rect l="0" t="0" r="0" b="0"/>
-          <a:pathLst/>
-        </a:custGeom>
-        <a:solidFill>
-          <a:schemeClr val="accent1"/>
-        </a:solidFill>
-        <a:ln w="9525" cap="flat" cmpd="sng" algn="ctr">
-          <a:solidFill>
-            <a:schemeClr val="tx1"/>
-          </a:solidFill>
-          <a:prstDash val="solid"/>
-          <a:round/>
-          <a:headEnd type="none" w="med" len="med"/>
-          <a:tailEnd type="none" w="med" len="med"/>
-        </a:ln>
-        <a:effectLst/>
-      </a:spPr>
-      <a:bodyPr vert="horz" wrap="square" lIns="91440" tIns="45720" rIns="91440" bIns="45720" numCol="1" anchor="t" anchorCtr="0" compatLnSpc="1">
-        <a:prstTxWarp prst="textNoShape">
-          <a:avLst/>
-        </a:prstTxWarp>
-      </a:bodyPr>
-      <a:lstStyle>
-        <a:defPPr marL="0" marR="0" indent="0" algn="l" defTabSz="914400" rtl="0" eaLnBrk="0" fontAlgn="base" latinLnBrk="0" hangingPunct="0">
-          <a:lnSpc>
-            <a:spcPct val="100000"/>
-          </a:lnSpc>
-          <a:spcBef>
-            <a:spcPct val="0"/>
-          </a:spcBef>
-          <a:spcAft>
-            <a:spcPct val="0"/>
-          </a:spcAft>
-          <a:buClrTx/>
-          <a:buSzTx/>
-          <a:buFontTx/>
-          <a:buNone/>
-          <a:tabLst/>
-          <a:defRPr kumimoji="0" lang="en-US" sz="2400" b="0" i="0" u="none" strike="noStrike" cap="none" normalizeH="0" baseline="0" smtClean="0">
-            <a:ln>
-              <a:noFill/>
-            </a:ln>
-            <a:solidFill>
-              <a:schemeClr val="tx1"/>
-            </a:solidFill>
-            <a:effectLst/>
-            <a:latin typeface="Times"/>
-          </a:defRPr>
-        </a:defPPr>
-      </a:lstStyle>
-    </a:lnDef>
-  </a:objectDefaults>
-  <a:extraClrSchemeLst>
-    <a:extraClrScheme>
-      <a:clrScheme name="Blank Presentation 1">
-        <a:dk1>
-          <a:srgbClr val="000000"/>
-        </a:dk1>
-        <a:lt1>
-          <a:srgbClr val="FFFFFF"/>
-        </a:lt1>
-        <a:dk2>
-          <a:srgbClr val="000000"/>
-        </a:dk2>
-        <a:lt2>
-          <a:srgbClr val="808080"/>
-        </a:lt2>
-        <a:accent1>
-          <a:srgbClr val="BBE0E3"/>
-        </a:accent1>
-        <a:accent2>
-          <a:srgbClr val="333399"/>
-        </a:accent2>
-        <a:accent3>
-          <a:srgbClr val="FFFFFF"/>
-        </a:accent3>
-        <a:accent4>
-          <a:srgbClr val="000000"/>
-        </a:accent4>
-        <a:accent5>
-          <a:srgbClr val="DAEDEF"/>
-        </a:accent5>
-        <a:accent6>
-          <a:srgbClr val="2D2D8A"/>
-        </a:accent6>
-        <a:hlink>
-          <a:srgbClr val="009999"/>
-        </a:hlink>
-        <a:folHlink>
-          <a:srgbClr val="99CC00"/>
-        </a:folHlink>
-      </a:clrScheme>
-      <a:clrMap bg1="lt1" tx1="dk1" bg2="lt2" tx2="dk2" accent1="accent1" accent2="accent2" accent3="accent3" accent4="accent4" accent5="accent5" accent6="accent6" hlink="hlink" folHlink="folHlink"/>
-    </a:extraClrScheme>
-    <a:extraClrScheme>
-      <a:clrScheme name="Blank Presentation 2">
-        <a:dk1>
-          <a:srgbClr val="000000"/>
-        </a:dk1>
-        <a:lt1>
-          <a:srgbClr val="FFFFFF"/>
-        </a:lt1>
-        <a:dk2>
-          <a:srgbClr val="000000"/>
-        </a:dk2>
-        <a:lt2>
-          <a:srgbClr val="969696"/>
-        </a:lt2>
-        <a:accent1>
-          <a:srgbClr val="FBDF53"/>
-        </a:accent1>
-        <a:accent2>
-          <a:srgbClr val="FF9966"/>
-        </a:accent2>
-        <a:accent3>
-          <a:srgbClr val="FFFFFF"/>
-        </a:accent3>
-        <a:accent4>
-          <a:srgbClr val="000000"/>
-        </a:accent4>
-        <a:accent5>
-          <a:srgbClr val="FDECB3"/>
-        </a:accent5>
-        <a:accent6>
-          <a:srgbClr val="E78A5C"/>
-        </a:accent6>
-        <a:hlink>
-          <a:srgbClr val="CC3300"/>
-        </a:hlink>
-        <a:folHlink>
-          <a:srgbClr val="996600"/>
-        </a:folHlink>
-      </a:clrScheme>
-      <a:clrMap bg1="lt1" tx1="dk1" bg2="lt2" tx2="dk2" accent1="accent1" accent2="accent2" accent3="accent3" accent4="accent4" accent5="accent5" accent6="accent6" hlink="hlink" folHlink="folHlink"/>
-    </a:extraClrScheme>
-    <a:extraClrScheme>
-      <a:clrScheme name="Blank Presentation 3">
-        <a:dk1>
-          <a:srgbClr val="000000"/>
-        </a:dk1>
-        <a:lt1>
-          <a:srgbClr val="FFFFFF"/>
-        </a:lt1>
-        <a:dk2>
-          <a:srgbClr val="000000"/>
-        </a:dk2>
-        <a:lt2>
-          <a:srgbClr val="808080"/>
-        </a:lt2>
-        <a:accent1>
-          <a:srgbClr val="99CCFF"/>
-        </a:accent1>
-        <a:accent2>
-          <a:srgbClr val="CCCCFF"/>
-        </a:accent2>
-        <a:accent3>
-          <a:srgbClr val="FFFFFF"/>
-        </a:accent3>
-        <a:accent4>
-          <a:srgbClr val="000000"/>
-        </a:accent4>
-        <a:accent5>
-          <a:srgbClr val="CAE2FF"/>
-        </a:accent5>
-        <a:accent6>
-          <a:srgbClr val="B9B9E7"/>
-        </a:accent6>
-        <a:hlink>
-          <a:srgbClr val="3333CC"/>
-        </a:hlink>
-        <a:folHlink>
-          <a:srgbClr val="AF67FF"/>
-        </a:folHlink>
-      </a:clrScheme>
-      <a:clrMap bg1="lt1" tx1="dk1" bg2="lt2" tx2="dk2" accent1="accent1" accent2="accent2" accent3="accent3" accent4="accent4" accent5="accent5" accent6="accent6" hlink="hlink" folHlink="folHlink"/>
-    </a:extraClrScheme>
-    <a:extraClrScheme>
-      <a:clrScheme name="Blank Presentation 4">
-        <a:dk1>
-          <a:srgbClr val="000000"/>
-        </a:dk1>
-        <a:lt1>
-          <a:srgbClr val="DEF6F1"/>
-        </a:lt1>
-        <a:dk2>
-          <a:srgbClr val="000000"/>
-        </a:dk2>
-        <a:lt2>
-          <a:srgbClr val="969696"/>
-        </a:lt2>
-        <a:accent1>
-          <a:srgbClr val="FFFFFF"/>
-        </a:accent1>
-        <a:accent2>
-          <a:srgbClr val="8DC6FF"/>
-        </a:accent2>
-        <a:accent3>
-          <a:srgbClr val="ECFAF7"/>
-        </a:accent3>
-        <a:accent4>
-          <a:srgbClr val="000000"/>
-        </a:accent4>
-        <a:accent5>
-          <a:srgbClr val="FFFFFF"/>
-        </a:accent5>
-        <a:accent6>
-          <a:srgbClr val="7FB3E7"/>
-        </a:accent6>
-        <a:hlink>
-          <a:srgbClr val="0066CC"/>
-        </a:hlink>
-        <a:folHlink>
-          <a:srgbClr val="00A800"/>
-        </a:folHlink>
-      </a:clrScheme>
-      <a:clrMap bg1="lt1" tx1="dk1" bg2="lt2" tx2="dk2" accent1="accent1" accent2="accent2" accent3="accent3" accent4="accent4" accent5="accent5" accent6="accent6" hlink="hlink" folHlink="folHlink"/>
-    </a:extraClrScheme>
-    <a:extraClrScheme>
-      <a:clrScheme name="Blank Presentation 5">
-        <a:dk1>
-          <a:srgbClr val="000000"/>
-        </a:dk1>
-        <a:lt1>
-          <a:srgbClr val="FFFFD9"/>
-        </a:lt1>
-        <a:dk2>
-          <a:srgbClr val="000000"/>
-        </a:dk2>
-        <a:lt2>
-          <a:srgbClr val="777777"/>
-        </a:lt2>
-        <a:accent1>
-          <a:srgbClr val="FFFFF7"/>
-        </a:accent1>
-        <a:accent2>
-          <a:srgbClr val="33CCCC"/>
-        </a:accent2>
-        <a:accent3>
-          <a:srgbClr val="FFFFE9"/>
-        </a:accent3>
-        <a:accent4>
-          <a:srgbClr val="000000"/>
-        </a:accent4>
-        <a:accent5>
-          <a:srgbClr val="FFFFFA"/>
-        </a:accent5>
-        <a:accent6>
-          <a:srgbClr val="2DB9B9"/>
-        </a:accent6>
-        <a:hlink>
-          <a:srgbClr val="FF5050"/>
-        </a:hlink>
-        <a:folHlink>
-          <a:srgbClr val="FF9900"/>
-        </a:folHlink>
-      </a:clrScheme>
-      <a:clrMap bg1="lt1" tx1="dk1" bg2="lt2" tx2="dk2" accent1="accent1" accent2="accent2" accent3="accent3" accent4="accent4" accent5="accent5" accent6="accent6" hlink="hlink" folHlink="folHlink"/>
-    </a:extraClrScheme>
-    <a:extraClrScheme>
-      <a:clrScheme name="Blank Presentation 6">
-        <a:dk1>
-          <a:srgbClr val="005A58"/>
-        </a:dk1>
-        <a:lt1>
-          <a:srgbClr val="FFFFFF"/>
-        </a:lt1>
-        <a:dk2>
-          <a:srgbClr val="008080"/>
-        </a:dk2>
-        <a:lt2>
-          <a:srgbClr val="FFFF99"/>
-        </a:lt2>
-        <a:accent1>
-          <a:srgbClr val="006462"/>
-        </a:accent1>
-        <a:accent2>
-          <a:srgbClr val="6D6FC7"/>
-        </a:accent2>
-        <a:accent3>
-          <a:srgbClr val="AAC0C0"/>
-        </a:accent3>
-        <a:accent4>
-          <a:srgbClr val="DADADA"/>
-        </a:accent4>
-        <a:accent5>
-          <a:srgbClr val="AAB8B7"/>
-        </a:accent5>
-        <a:accent6>
-          <a:srgbClr val="6264B4"/>
-        </a:accent6>
-        <a:hlink>
-          <a:srgbClr val="00FFFF"/>
-        </a:hlink>
-        <a:folHlink>
-          <a:srgbClr val="00FF00"/>
-        </a:folHlink>
-      </a:clrScheme>
-      <a:clrMap bg1="dk2" tx1="lt1" bg2="dk1" tx2="lt2" accent1="accent1" accent2="accent2" accent3="accent3" accent4="accent4" accent5="accent5" accent6="accent6" hlink="hlink" folHlink="folHlink"/>
-    </a:extraClrScheme>
-    <a:extraClrScheme>
-      <a:clrScheme name="Blank Presentation 7">
-        <a:dk1>
-          <a:srgbClr val="5C1F00"/>
-        </a:dk1>
-        <a:lt1>
-          <a:srgbClr val="FFFFFF"/>
-        </a:lt1>
-        <a:dk2>
-          <a:srgbClr val="800000"/>
-        </a:dk2>
-        <a:lt2>
-          <a:srgbClr val="DFD293"/>
-        </a:lt2>
-        <a:accent1>
-          <a:srgbClr val="713E39"/>
-        </a:accent1>
-        <a:accent2>
-          <a:srgbClr val="BE7960"/>
-        </a:accent2>
-        <a:accent3>
-          <a:srgbClr val="C0AAAA"/>
-        </a:accent3>
-        <a:accent4>
-          <a:srgbClr val="DADADA"/>
-        </a:accent4>
-        <a:accent5>
-          <a:srgbClr val="BBAFAE"/>
-        </a:accent5>
-        <a:accent6>
-          <a:srgbClr val="AC6D56"/>
-        </a:accent6>
-        <a:hlink>
-          <a:srgbClr val="FFFF99"/>
-        </a:hlink>
-        <a:folHlink>
-          <a:srgbClr val="D3A219"/>
-        </a:folHlink>
-      </a:clrScheme>
-      <a:clrMap bg1="dk2" tx1="lt1" bg2="dk1" tx2="lt2" accent1="accent1" accent2="accent2" accent3="accent3" accent4="accent4" accent5="accent5" accent6="accent6" hlink="hlink" folHlink="folHlink"/>
-    </a:extraClrScheme>
-    <a:extraClrScheme>
-      <a:clrScheme name="Blank Presentation 8">
-        <a:dk1>
-          <a:srgbClr val="003366"/>
-        </a:dk1>
-        <a:lt1>
-          <a:srgbClr val="FFFFFF"/>
-        </a:lt1>
-        <a:dk2>
-          <a:srgbClr val="000099"/>
-        </a:dk2>
-        <a:lt2>
-          <a:srgbClr val="CCFFFF"/>
-        </a:lt2>
-        <a:accent1>
-          <a:srgbClr val="3366CC"/>
-        </a:accent1>
-        <a:accent2>
-          <a:srgbClr val="00B000"/>
-        </a:accent2>
-        <a:accent3>
-          <a:srgbClr val="AAAACA"/>
-        </a:accent3>
-        <a:accent4>
-          <a:srgbClr val="DADADA"/>
-        </a:accent4>
-        <a:accent5>
-          <a:srgbClr val="ADB8E2"/>
-        </a:accent5>
-        <a:accent6>
-          <a:srgbClr val="009F00"/>
-        </a:accent6>
-        <a:hlink>
-          <a:srgbClr val="66CCFF"/>
-        </a:hlink>
-        <a:folHlink>
-          <a:srgbClr val="FFE701"/>
-        </a:folHlink>
-      </a:clrScheme>
-      <a:clrMap bg1="dk2" tx1="lt1" bg2="dk1" tx2="lt2" accent1="accent1" accent2="accent2" accent3="accent3" accent4="accent4" accent5="accent5" accent6="accent6" hlink="hlink" folHlink="folHlink"/>
-    </a:extraClrScheme>
-    <a:extraClrScheme>
-      <a:clrScheme name="Blank Presentation 9">
-        <a:dk1>
-          <a:srgbClr val="336699"/>
-        </a:dk1>
-        <a:lt1>
-          <a:srgbClr val="FFFFFF"/>
-        </a:lt1>
-        <a:dk2>
-          <a:srgbClr val="000000"/>
-        </a:dk2>
-        <a:lt2>
-          <a:srgbClr val="E3EBF1"/>
-        </a:lt2>
-        <a:accent1>
-          <a:srgbClr val="003399"/>
-        </a:accent1>
-        <a:accent2>
-          <a:srgbClr val="468A4B"/>
-        </a:accent2>
-        <a:accent3>
-          <a:srgbClr val="AAAAAA"/>
-        </a:accent3>
-        <a:accent4>
-          <a:srgbClr val="DADADA"/>
-        </a:accent4>
-        <a:accent5>
-          <a:srgbClr val="AAADCA"/>
-        </a:accent5>
-        <a:accent6>
-          <a:srgbClr val="3F7D43"/>
-        </a:accent6>
-        <a:hlink>
-          <a:srgbClr val="66CCFF"/>
-        </a:hlink>
-        <a:folHlink>
-          <a:srgbClr val="F0E500"/>
-        </a:folHlink>
-      </a:clrScheme>
-      <a:clrMap bg1="dk2" tx1="lt1" bg2="dk1" tx2="lt2" accent1="accent1" accent2="accent2" accent3="accent3" accent4="accent4" accent5="accent5" accent6="accent6" hlink="hlink" folHlink="folHlink"/>
-    </a:extraClrScheme>
-    <a:extraClrScheme>
-      <a:clrScheme name="Blank Presentation 10">
-        <a:dk1>
-          <a:srgbClr val="777777"/>
-        </a:dk1>
-        <a:lt1>
-          <a:srgbClr val="FFFFFF"/>
-        </a:lt1>
-        <a:dk2>
-          <a:srgbClr val="686B5D"/>
-        </a:dk2>
-        <a:lt2>
-          <a:srgbClr val="D1D1CB"/>
-        </a:lt2>
-        <a:accent1>
-          <a:srgbClr val="909082"/>
-        </a:accent1>
-        <a:accent2>
-          <a:srgbClr val="809EA8"/>
-        </a:accent2>
-        <a:accent3>
-          <a:srgbClr val="B9BAB6"/>
-        </a:accent3>
-        <a:accent4>
-          <a:srgbClr val="DADADA"/>
-        </a:accent4>
-        <a:accent5>
-          <a:srgbClr val="C6C6C1"/>
-        </a:accent5>
-        <a:accent6>
-          <a:srgbClr val="738F98"/>
-        </a:accent6>
-        <a:hlink>
-          <a:srgbClr val="FFCC66"/>
-        </a:hlink>
-        <a:folHlink>
-          <a:srgbClr val="E9DCB9"/>
-        </a:folHlink>
-      </a:clrScheme>
-      <a:clrMap bg1="dk2" tx1="lt1" bg2="dk1" tx2="lt2" accent1="accent1" accent2="accent2" accent3="accent3" accent4="accent4" accent5="accent5" accent6="accent6" hlink="hlink" folHlink="folHlink"/>
-    </a:extraClrScheme>
-    <a:extraClrScheme>
-      <a:clrScheme name="Blank Presentation 11">
-        <a:dk1>
-          <a:srgbClr val="3E3E5C"/>
-        </a:dk1>
-        <a:lt1>
-          <a:srgbClr val="FFFFFF"/>
-        </a:lt1>
-        <a:dk2>
-          <a:srgbClr val="666699"/>
-        </a:dk2>
-        <a:lt2>
-          <a:srgbClr val="FFFFFF"/>
-        </a:lt2>
-        <a:accent1>
-          <a:srgbClr val="60597B"/>
-        </a:accent1>
-        <a:accent2>
-          <a:srgbClr val="6666FF"/>
-        </a:accent2>
-        <a:accent3>
-          <a:srgbClr val="B8B8CA"/>
-        </a:accent3>
-        <a:accent4>
-          <a:srgbClr val="DADADA"/>
-        </a:accent4>
-        <a:accent5>
-          <a:srgbClr val="B6B5BF"/>
-        </a:accent5>
-        <a:accent6>
-          <a:srgbClr val="5C5CE7"/>
-        </a:accent6>
-        <a:hlink>
-          <a:srgbClr val="99CCFF"/>
-        </a:hlink>
-        <a:folHlink>
-          <a:srgbClr val="FFFF99"/>
-        </a:folHlink>
-      </a:clrScheme>
-      <a:clrMap bg1="dk2" tx1="lt1" bg2="dk1" tx2="lt2" accent1="accent1" accent2="accent2" accent3="accent3" accent4="accent4" accent5="accent5" accent6="accent6" hlink="hlink" folHlink="folHlink"/>
-    </a:extraClrScheme>
-    <a:extraClrScheme>
-      <a:clrScheme name="Blank Presentation 12">
-        <a:dk1>
-          <a:srgbClr val="2D2015"/>
-        </a:dk1>
-        <a:lt1>
-          <a:srgbClr val="FFFFFF"/>
-        </a:lt1>
-        <a:dk2>
-          <a:srgbClr val="523E26"/>
-        </a:dk2>
-        <a:lt2>
-          <a:srgbClr val="DFC08D"/>
-        </a:lt2>
-        <a:accent1>
-          <a:srgbClr val="8C7B70"/>
-        </a:accent1>
-        <a:accent2>
-          <a:srgbClr val="8F5F2F"/>
-        </a:accent2>
-        <a:accent3>
-          <a:srgbClr val="B3AFAC"/>
-        </a:accent3>
-        <a:accent4>
-          <a:srgbClr val="DADADA"/>
-        </a:accent4>
-        <a:accent5>
-          <a:srgbClr val="C5BFBB"/>
-        </a:accent5>
-        <a:accent6>
-          <a:srgbClr val="81552A"/>
-        </a:accent6>
-        <a:hlink>
-          <a:srgbClr val="CCB400"/>
-        </a:hlink>
-        <a:folHlink>
-          <a:srgbClr val="8C9EA0"/>
-        </a:folHlink>
-      </a:clrScheme>
-      <a:clrMap bg1="dk2" tx1="lt1" bg2="dk1" tx2="lt2" accent1="accent1" accent2="accent2" accent3="accent3" accent4="accent4" accent5="accent5" accent6="accent6" hlink="hlink" folHlink="folHlink"/>
-    </a:extraClrScheme>
-  </a:extraClrSchemeLst>
+  <a:objectDefaults/>
+  <a:extraClrSchemeLst/>
 </a:theme>
 </file>
</xml_diff>